<commit_message>
updates to delay, vibrato
</commit_message>
<xml_diff>
--- a/03 - Delay effects/A - Delay/Delay.pptx
+++ b/03 - Delay effects/A - Delay/Delay.pptx
@@ -6,7 +6,7 @@
     <p:sldMasterId id="2147483660" r:id="rId2"/>
   </p:sldMasterIdLst>
   <p:notesMasterIdLst>
-    <p:notesMasterId r:id="rId30"/>
+    <p:notesMasterId r:id="rId29"/>
   </p:notesMasterIdLst>
   <p:sldIdLst>
     <p:sldId id="295" r:id="rId3"/>
@@ -28,14 +28,13 @@
     <p:sldId id="314" r:id="rId19"/>
     <p:sldId id="284" r:id="rId20"/>
     <p:sldId id="280" r:id="rId21"/>
-    <p:sldId id="281" r:id="rId22"/>
-    <p:sldId id="315" r:id="rId23"/>
-    <p:sldId id="307" r:id="rId24"/>
-    <p:sldId id="292" r:id="rId25"/>
-    <p:sldId id="293" r:id="rId26"/>
-    <p:sldId id="310" r:id="rId27"/>
-    <p:sldId id="311" r:id="rId28"/>
-    <p:sldId id="313" r:id="rId29"/>
+    <p:sldId id="315" r:id="rId22"/>
+    <p:sldId id="307" r:id="rId23"/>
+    <p:sldId id="292" r:id="rId24"/>
+    <p:sldId id="293" r:id="rId25"/>
+    <p:sldId id="310" r:id="rId26"/>
+    <p:sldId id="311" r:id="rId27"/>
+    <p:sldId id="313" r:id="rId28"/>
   </p:sldIdLst>
   <p:sldSz cx="12192000" cy="6858000"/>
   <p:notesSz cx="6858000" cy="9144000"/>
@@ -227,7 +226,7 @@
           <a:p>
             <a:fld id="{BE487CCF-3B53-4F90-977B-B099D72D42DC}" type="datetimeFigureOut">
               <a:rPr lang="en-GB" smtClean="0"/>
-              <a:t>07/02/2024</a:t>
+              <a:t>16/02/2024</a:t>
             </a:fld>
             <a:endParaRPr lang="en-GB"/>
           </a:p>
@@ -630,8 +629,8 @@
         </p:nvSpPr>
         <p:spPr bwMode="auto">
           <a:xfrm>
-            <a:off x="992188" y="768350"/>
-            <a:ext cx="5114925" cy="3836988"/>
+            <a:off x="139700" y="768350"/>
+            <a:ext cx="6819900" cy="3836988"/>
           </a:xfrm>
           <a:prstGeom prst="rect">
             <a:avLst/>
@@ -2147,7 +2146,7 @@
     </p:spTree>
     <p:extLst>
       <p:ext uri="{BB962C8B-B14F-4D97-AF65-F5344CB8AC3E}">
-        <p14:creationId xmlns:p14="http://schemas.microsoft.com/office/powerpoint/2010/main" val="330193073"/>
+        <p14:creationId xmlns:p14="http://schemas.microsoft.com/office/powerpoint/2010/main" val="999337022"/>
       </p:ext>
     </p:extLst>
   </p:cSld>
@@ -2158,125 +2157,6 @@
 </file>
 
 <file path=ppt/notesSlides/notesSlide16.xml><?xml version="1.0" encoding="utf-8"?>
-<p:notes xmlns:a="http://schemas.openxmlformats.org/drawingml/2006/main" xmlns:r="http://schemas.openxmlformats.org/officeDocument/2006/relationships" xmlns:p="http://schemas.openxmlformats.org/presentationml/2006/main">
-  <p:cSld>
-    <p:spTree>
-      <p:nvGrpSpPr>
-        <p:cNvPr id="1" name=""/>
-        <p:cNvGrpSpPr/>
-        <p:nvPr/>
-      </p:nvGrpSpPr>
-      <p:grpSpPr>
-        <a:xfrm>
-          <a:off x="0" y="0"/>
-          <a:ext cx="0" cy="0"/>
-          <a:chOff x="0" y="0"/>
-          <a:chExt cx="0" cy="0"/>
-        </a:xfrm>
-      </p:grpSpPr>
-      <p:sp>
-        <p:nvSpPr>
-          <p:cNvPr id="2" name="Slide Image Placeholder 1"/>
-          <p:cNvSpPr>
-            <a:spLocks noGrp="1" noRot="1" noChangeAspect="1"/>
-          </p:cNvSpPr>
-          <p:nvPr>
-            <p:ph type="sldImg"/>
-          </p:nvPr>
-        </p:nvSpPr>
-        <p:spPr/>
-      </p:sp>
-      <p:sp>
-        <p:nvSpPr>
-          <p:cNvPr id="3" name="Notes Placeholder 2"/>
-          <p:cNvSpPr>
-            <a:spLocks noGrp="1"/>
-          </p:cNvSpPr>
-          <p:nvPr>
-            <p:ph type="body" idx="1"/>
-          </p:nvPr>
-        </p:nvSpPr>
-        <p:spPr/>
-        <p:txBody>
-          <a:bodyPr/>
-          <a:lstStyle/>
-          <a:p>
-            <a:pPr>
-              <a:lnSpc>
-                <a:spcPct val="100000"/>
-              </a:lnSpc>
-              <a:spcBef>
-                <a:spcPts val="300"/>
-              </a:spcBef>
-              <a:spcAft>
-                <a:spcPts val="200"/>
-              </a:spcAft>
-              <a:buSzPct val="80000"/>
-              <a:tabLst>
-                <a:tab pos="457200" algn="l"/>
-              </a:tabLst>
-            </a:pPr>
-            <a:r>
-              <a:rPr lang="en-GB" sz="1200" dirty="0">
-                <a:effectLst/>
-                <a:ea typeface="Times New Roman" panose="02020603050405020304" pitchFamily="18" charset="0"/>
-              </a:rPr>
-              <a:t>must pass </a:t>
-            </a:r>
-            <a:r>
-              <a:rPr lang="en-GB" sz="1200" dirty="0" err="1">
-                <a:effectLst/>
-                <a:ea typeface="Times New Roman" panose="02020603050405020304" pitchFamily="18" charset="0"/>
-              </a:rPr>
-              <a:t>MidiKeyboardState</a:t>
-            </a:r>
-            <a:r>
-              <a:rPr lang="en-GB" sz="1200" dirty="0">
-                <a:effectLst/>
-                <a:ea typeface="Times New Roman" panose="02020603050405020304" pitchFamily="18" charset="0"/>
-              </a:rPr>
-              <a:t> object to initialise MidiKeyboardComponent object</a:t>
-            </a:r>
-          </a:p>
-        </p:txBody>
-      </p:sp>
-      <p:sp>
-        <p:nvSpPr>
-          <p:cNvPr id="4" name="Slide Number Placeholder 3"/>
-          <p:cNvSpPr>
-            <a:spLocks noGrp="1"/>
-          </p:cNvSpPr>
-          <p:nvPr>
-            <p:ph type="sldNum" sz="quarter" idx="5"/>
-          </p:nvPr>
-        </p:nvSpPr>
-        <p:spPr/>
-        <p:txBody>
-          <a:bodyPr/>
-          <a:lstStyle/>
-          <a:p>
-            <a:fld id="{0FEDB78B-1C29-47A0-98D1-C458191ECDD0}" type="slidenum">
-              <a:rPr lang="en-GB" smtClean="0"/>
-              <a:t>21</a:t>
-            </a:fld>
-            <a:endParaRPr lang="en-GB"/>
-          </a:p>
-        </p:txBody>
-      </p:sp>
-    </p:spTree>
-    <p:extLst>
-      <p:ext uri="{BB962C8B-B14F-4D97-AF65-F5344CB8AC3E}">
-        <p14:creationId xmlns:p14="http://schemas.microsoft.com/office/powerpoint/2010/main" val="999337022"/>
-      </p:ext>
-    </p:extLst>
-  </p:cSld>
-  <p:clrMapOvr>
-    <a:masterClrMapping/>
-  </p:clrMapOvr>
-</p:notes>
-</file>
-
-<file path=ppt/notesSlides/notesSlide17.xml><?xml version="1.0" encoding="utf-8"?>
 <p:notes xmlns:a="http://schemas.openxmlformats.org/drawingml/2006/main" xmlns:r="http://schemas.openxmlformats.org/officeDocument/2006/relationships" xmlns:p="http://schemas.openxmlformats.org/presentationml/2006/main">
   <p:cSld>
     <p:spTree>
@@ -2382,6 +2262,150 @@
 </p:notes>
 </file>
 
+<file path=ppt/notesSlides/notesSlide17.xml><?xml version="1.0" encoding="utf-8"?>
+<p:notes xmlns:a="http://schemas.openxmlformats.org/drawingml/2006/main" xmlns:r="http://schemas.openxmlformats.org/officeDocument/2006/relationships" xmlns:p="http://schemas.openxmlformats.org/presentationml/2006/main">
+  <p:cSld>
+    <p:spTree>
+      <p:nvGrpSpPr>
+        <p:cNvPr id="1" name=""/>
+        <p:cNvGrpSpPr/>
+        <p:nvPr/>
+      </p:nvGrpSpPr>
+      <p:grpSpPr>
+        <a:xfrm>
+          <a:off x="0" y="0"/>
+          <a:ext cx="0" cy="0"/>
+          <a:chOff x="0" y="0"/>
+          <a:chExt cx="0" cy="0"/>
+        </a:xfrm>
+      </p:grpSpPr>
+      <p:sp>
+        <p:nvSpPr>
+          <p:cNvPr id="2" name="Slide Image Placeholder 1"/>
+          <p:cNvSpPr>
+            <a:spLocks noGrp="1" noRot="1" noChangeAspect="1"/>
+          </p:cNvSpPr>
+          <p:nvPr>
+            <p:ph type="sldImg"/>
+          </p:nvPr>
+        </p:nvSpPr>
+        <p:spPr/>
+      </p:sp>
+      <p:sp>
+        <p:nvSpPr>
+          <p:cNvPr id="3" name="Notes Placeholder 2"/>
+          <p:cNvSpPr>
+            <a:spLocks noGrp="1"/>
+          </p:cNvSpPr>
+          <p:nvPr>
+            <p:ph type="body" idx="1"/>
+          </p:nvPr>
+        </p:nvSpPr>
+        <p:spPr/>
+        <p:txBody>
+          <a:bodyPr/>
+          <a:lstStyle/>
+          <a:p>
+            <a:endParaRPr lang="en-GB" dirty="0"/>
+          </a:p>
+        </p:txBody>
+      </p:sp>
+      <p:sp>
+        <p:nvSpPr>
+          <p:cNvPr id="4" name="Slide Number Placeholder 3"/>
+          <p:cNvSpPr>
+            <a:spLocks noGrp="1"/>
+          </p:cNvSpPr>
+          <p:nvPr>
+            <p:ph type="sldNum" sz="quarter" idx="5"/>
+          </p:nvPr>
+        </p:nvSpPr>
+        <p:spPr/>
+        <p:txBody>
+          <a:bodyPr/>
+          <a:lstStyle/>
+          <a:p>
+            <a:pPr marL="0" marR="0" lvl="0" indent="0" algn="r" defTabSz="914400" rtl="0" eaLnBrk="1" fontAlgn="auto" latinLnBrk="0" hangingPunct="1">
+              <a:lnSpc>
+                <a:spcPct val="100000"/>
+              </a:lnSpc>
+              <a:spcBef>
+                <a:spcPts val="0"/>
+              </a:spcBef>
+              <a:spcAft>
+                <a:spcPts val="0"/>
+              </a:spcAft>
+              <a:buClrTx/>
+              <a:buSzTx/>
+              <a:buFontTx/>
+              <a:buNone/>
+              <a:tabLst/>
+              <a:defRPr/>
+            </a:pPr>
+            <a:fld id="{0FEDB78B-1C29-47A0-98D1-C458191ECDD0}" type="slidenum">
+              <a:rPr kumimoji="0" lang="en-GB" sz="1200" b="0" i="0" u="none" strike="noStrike" kern="1200" cap="none" spc="0" normalizeH="0" baseline="0" noProof="0" smtClean="0">
+                <a:ln>
+                  <a:noFill/>
+                </a:ln>
+                <a:solidFill>
+                  <a:prstClr val="black"/>
+                </a:solidFill>
+                <a:effectLst/>
+                <a:uLnTx/>
+                <a:uFillTx/>
+                <a:latin typeface="Calibri" panose="020F0502020204030204"/>
+                <a:ea typeface="+mn-ea"/>
+                <a:cs typeface="+mn-cs"/>
+              </a:rPr>
+              <a:pPr marL="0" marR="0" lvl="0" indent="0" algn="r" defTabSz="914400" rtl="0" eaLnBrk="1" fontAlgn="auto" latinLnBrk="0" hangingPunct="1">
+                <a:lnSpc>
+                  <a:spcPct val="100000"/>
+                </a:lnSpc>
+                <a:spcBef>
+                  <a:spcPts val="0"/>
+                </a:spcBef>
+                <a:spcAft>
+                  <a:spcPts val="0"/>
+                </a:spcAft>
+                <a:buClrTx/>
+                <a:buSzTx/>
+                <a:buFontTx/>
+                <a:buNone/>
+                <a:tabLst/>
+                <a:defRPr/>
+              </a:pPr>
+              <a:t>24</a:t>
+            </a:fld>
+            <a:endParaRPr kumimoji="0" lang="en-GB" sz="1200" b="0" i="0" u="none" strike="noStrike" kern="1200" cap="none" spc="0" normalizeH="0" baseline="0" noProof="0">
+              <a:ln>
+                <a:noFill/>
+              </a:ln>
+              <a:solidFill>
+                <a:prstClr val="black"/>
+              </a:solidFill>
+              <a:effectLst/>
+              <a:uLnTx/>
+              <a:uFillTx/>
+              <a:latin typeface="Calibri" panose="020F0502020204030204"/>
+              <a:ea typeface="+mn-ea"/>
+              <a:cs typeface="+mn-cs"/>
+            </a:endParaRPr>
+          </a:p>
+        </p:txBody>
+      </p:sp>
+    </p:spTree>
+    <p:extLst>
+      <p:ext uri="{BB962C8B-B14F-4D97-AF65-F5344CB8AC3E}">
+        <p14:creationId xmlns:p14="http://schemas.microsoft.com/office/powerpoint/2010/main" val="363978050"/>
+      </p:ext>
+    </p:extLst>
+  </p:cSld>
+  <p:clrMapOvr>
+    <a:masterClrMapping/>
+  </p:clrMapOvr>
+</p:notes>
+</file>
+
 <file path=ppt/notesSlides/notesSlide18.xml><?xml version="1.0" encoding="utf-8"?>
 <p:notes xmlns:a="http://schemas.openxmlformats.org/drawingml/2006/main" xmlns:r="http://schemas.openxmlformats.org/officeDocument/2006/relationships" xmlns:p="http://schemas.openxmlformats.org/presentationml/2006/main">
   <p:cSld>
@@ -2426,7 +2450,42 @@
           <a:bodyPr/>
           <a:lstStyle/>
           <a:p>
-            <a:endParaRPr lang="en-GB" dirty="0"/>
+            <a:pPr>
+              <a:lnSpc>
+                <a:spcPct val="100000"/>
+              </a:lnSpc>
+              <a:spcBef>
+                <a:spcPts val="300"/>
+              </a:spcBef>
+              <a:spcAft>
+                <a:spcPts val="200"/>
+              </a:spcAft>
+              <a:buSzPct val="80000"/>
+              <a:tabLst>
+                <a:tab pos="457200" algn="l"/>
+              </a:tabLst>
+            </a:pPr>
+            <a:r>
+              <a:rPr lang="en-GB" sz="1200" dirty="0">
+                <a:effectLst/>
+                <a:ea typeface="Times New Roman" panose="02020603050405020304" pitchFamily="18" charset="0"/>
+              </a:rPr>
+              <a:t>must pass </a:t>
+            </a:r>
+            <a:r>
+              <a:rPr lang="en-GB" sz="1200" dirty="0" err="1">
+                <a:effectLst/>
+                <a:ea typeface="Times New Roman" panose="02020603050405020304" pitchFamily="18" charset="0"/>
+              </a:rPr>
+              <a:t>MidiKeyboardState</a:t>
+            </a:r>
+            <a:r>
+              <a:rPr lang="en-GB" sz="1200" dirty="0">
+                <a:effectLst/>
+                <a:ea typeface="Times New Roman" panose="02020603050405020304" pitchFamily="18" charset="0"/>
+              </a:rPr>
+              <a:t> object to initialise MidiKeyboardComponent object</a:t>
+            </a:r>
           </a:p>
         </p:txBody>
       </p:sp>
@@ -2516,7 +2575,7 @@
     </p:spTree>
     <p:extLst>
       <p:ext uri="{BB962C8B-B14F-4D97-AF65-F5344CB8AC3E}">
-        <p14:creationId xmlns:p14="http://schemas.microsoft.com/office/powerpoint/2010/main" val="363978050"/>
+        <p14:creationId xmlns:p14="http://schemas.microsoft.com/office/powerpoint/2010/main" val="1072237141"/>
       </p:ext>
     </p:extLst>
   </p:cSld>
@@ -2585,27 +2644,10 @@
                 <a:tab pos="457200" algn="l"/>
               </a:tabLst>
             </a:pPr>
-            <a:r>
-              <a:rPr lang="en-GB" sz="1200" dirty="0">
-                <a:effectLst/>
-                <a:ea typeface="Times New Roman" panose="02020603050405020304" pitchFamily="18" charset="0"/>
-              </a:rPr>
-              <a:t>must pass </a:t>
-            </a:r>
-            <a:r>
-              <a:rPr lang="en-GB" sz="1200" dirty="0" err="1">
-                <a:effectLst/>
-                <a:ea typeface="Times New Roman" panose="02020603050405020304" pitchFamily="18" charset="0"/>
-              </a:rPr>
-              <a:t>MidiKeyboardState</a:t>
-            </a:r>
-            <a:r>
-              <a:rPr lang="en-GB" sz="1200" dirty="0">
-                <a:effectLst/>
-                <a:ea typeface="Times New Roman" panose="02020603050405020304" pitchFamily="18" charset="0"/>
-              </a:rPr>
-              <a:t> object to initialise MidiKeyboardComponent object</a:t>
-            </a:r>
+            <a:endParaRPr lang="en-GB" sz="1200" dirty="0">
+              <a:effectLst/>
+              <a:ea typeface="Times New Roman" panose="02020603050405020304" pitchFamily="18" charset="0"/>
+            </a:endParaRPr>
           </a:p>
         </p:txBody>
       </p:sp>
@@ -2695,7 +2737,7 @@
     </p:spTree>
     <p:extLst>
       <p:ext uri="{BB962C8B-B14F-4D97-AF65-F5344CB8AC3E}">
-        <p14:creationId xmlns:p14="http://schemas.microsoft.com/office/powerpoint/2010/main" val="1072237141"/>
+        <p14:creationId xmlns:p14="http://schemas.microsoft.com/office/powerpoint/2010/main" val="2940458107"/>
       </p:ext>
     </p:extLst>
   </p:cSld>
@@ -2853,168 +2895,6 @@
     <p:extLst>
       <p:ext uri="{BB962C8B-B14F-4D97-AF65-F5344CB8AC3E}">
         <p14:creationId xmlns:p14="http://schemas.microsoft.com/office/powerpoint/2010/main" val="2260180013"/>
-      </p:ext>
-    </p:extLst>
-  </p:cSld>
-  <p:clrMapOvr>
-    <a:masterClrMapping/>
-  </p:clrMapOvr>
-</p:notes>
-</file>
-
-<file path=ppt/notesSlides/notesSlide20.xml><?xml version="1.0" encoding="utf-8"?>
-<p:notes xmlns:a="http://schemas.openxmlformats.org/drawingml/2006/main" xmlns:r="http://schemas.openxmlformats.org/officeDocument/2006/relationships" xmlns:p="http://schemas.openxmlformats.org/presentationml/2006/main">
-  <p:cSld>
-    <p:spTree>
-      <p:nvGrpSpPr>
-        <p:cNvPr id="1" name=""/>
-        <p:cNvGrpSpPr/>
-        <p:nvPr/>
-      </p:nvGrpSpPr>
-      <p:grpSpPr>
-        <a:xfrm>
-          <a:off x="0" y="0"/>
-          <a:ext cx="0" cy="0"/>
-          <a:chOff x="0" y="0"/>
-          <a:chExt cx="0" cy="0"/>
-        </a:xfrm>
-      </p:grpSpPr>
-      <p:sp>
-        <p:nvSpPr>
-          <p:cNvPr id="2" name="Slide Image Placeholder 1"/>
-          <p:cNvSpPr>
-            <a:spLocks noGrp="1" noRot="1" noChangeAspect="1"/>
-          </p:cNvSpPr>
-          <p:nvPr>
-            <p:ph type="sldImg"/>
-          </p:nvPr>
-        </p:nvSpPr>
-        <p:spPr/>
-      </p:sp>
-      <p:sp>
-        <p:nvSpPr>
-          <p:cNvPr id="3" name="Notes Placeholder 2"/>
-          <p:cNvSpPr>
-            <a:spLocks noGrp="1"/>
-          </p:cNvSpPr>
-          <p:nvPr>
-            <p:ph type="body" idx="1"/>
-          </p:nvPr>
-        </p:nvSpPr>
-        <p:spPr/>
-        <p:txBody>
-          <a:bodyPr/>
-          <a:lstStyle/>
-          <a:p>
-            <a:pPr>
-              <a:lnSpc>
-                <a:spcPct val="100000"/>
-              </a:lnSpc>
-              <a:spcBef>
-                <a:spcPts val="300"/>
-              </a:spcBef>
-              <a:spcAft>
-                <a:spcPts val="200"/>
-              </a:spcAft>
-              <a:buSzPct val="80000"/>
-              <a:tabLst>
-                <a:tab pos="457200" algn="l"/>
-              </a:tabLst>
-            </a:pPr>
-            <a:endParaRPr lang="en-GB" sz="1200" dirty="0">
-              <a:effectLst/>
-              <a:ea typeface="Times New Roman" panose="02020603050405020304" pitchFamily="18" charset="0"/>
-            </a:endParaRPr>
-          </a:p>
-        </p:txBody>
-      </p:sp>
-      <p:sp>
-        <p:nvSpPr>
-          <p:cNvPr id="4" name="Slide Number Placeholder 3"/>
-          <p:cNvSpPr>
-            <a:spLocks noGrp="1"/>
-          </p:cNvSpPr>
-          <p:nvPr>
-            <p:ph type="sldNum" sz="quarter" idx="5"/>
-          </p:nvPr>
-        </p:nvSpPr>
-        <p:spPr/>
-        <p:txBody>
-          <a:bodyPr/>
-          <a:lstStyle/>
-          <a:p>
-            <a:pPr marL="0" marR="0" lvl="0" indent="0" algn="r" defTabSz="914400" rtl="0" eaLnBrk="1" fontAlgn="auto" latinLnBrk="0" hangingPunct="1">
-              <a:lnSpc>
-                <a:spcPct val="100000"/>
-              </a:lnSpc>
-              <a:spcBef>
-                <a:spcPts val="0"/>
-              </a:spcBef>
-              <a:spcAft>
-                <a:spcPts val="0"/>
-              </a:spcAft>
-              <a:buClrTx/>
-              <a:buSzTx/>
-              <a:buFontTx/>
-              <a:buNone/>
-              <a:tabLst/>
-              <a:defRPr/>
-            </a:pPr>
-            <a:fld id="{0FEDB78B-1C29-47A0-98D1-C458191ECDD0}" type="slidenum">
-              <a:rPr kumimoji="0" lang="en-GB" sz="1200" b="0" i="0" u="none" strike="noStrike" kern="1200" cap="none" spc="0" normalizeH="0" baseline="0" noProof="0" smtClean="0">
-                <a:ln>
-                  <a:noFill/>
-                </a:ln>
-                <a:solidFill>
-                  <a:prstClr val="black"/>
-                </a:solidFill>
-                <a:effectLst/>
-                <a:uLnTx/>
-                <a:uFillTx/>
-                <a:latin typeface="Calibri" panose="020F0502020204030204"/>
-                <a:ea typeface="+mn-ea"/>
-                <a:cs typeface="+mn-cs"/>
-              </a:rPr>
-              <a:pPr marL="0" marR="0" lvl="0" indent="0" algn="r" defTabSz="914400" rtl="0" eaLnBrk="1" fontAlgn="auto" latinLnBrk="0" hangingPunct="1">
-                <a:lnSpc>
-                  <a:spcPct val="100000"/>
-                </a:lnSpc>
-                <a:spcBef>
-                  <a:spcPts val="0"/>
-                </a:spcBef>
-                <a:spcAft>
-                  <a:spcPts val="0"/>
-                </a:spcAft>
-                <a:buClrTx/>
-                <a:buSzTx/>
-                <a:buFontTx/>
-                <a:buNone/>
-                <a:tabLst/>
-                <a:defRPr/>
-              </a:pPr>
-              <a:t>27</a:t>
-            </a:fld>
-            <a:endParaRPr kumimoji="0" lang="en-GB" sz="1200" b="0" i="0" u="none" strike="noStrike" kern="1200" cap="none" spc="0" normalizeH="0" baseline="0" noProof="0">
-              <a:ln>
-                <a:noFill/>
-              </a:ln>
-              <a:solidFill>
-                <a:prstClr val="black"/>
-              </a:solidFill>
-              <a:effectLst/>
-              <a:uLnTx/>
-              <a:uFillTx/>
-              <a:latin typeface="Calibri" panose="020F0502020204030204"/>
-              <a:ea typeface="+mn-ea"/>
-              <a:cs typeface="+mn-cs"/>
-            </a:endParaRPr>
-          </a:p>
-        </p:txBody>
-      </p:sp>
-    </p:spTree>
-    <p:extLst>
-      <p:ext uri="{BB962C8B-B14F-4D97-AF65-F5344CB8AC3E}">
-        <p14:creationId xmlns:p14="http://schemas.microsoft.com/office/powerpoint/2010/main" val="2940458107"/>
       </p:ext>
     </p:extLst>
   </p:cSld>
@@ -3908,7 +3788,7 @@
           <a:p>
             <a:fld id="{F8A5948D-6B6B-4AEB-B022-F2A9ADD6F77D}" type="datetimeFigureOut">
               <a:rPr lang="en-GB" smtClean="0"/>
-              <a:t>07/02/2024</a:t>
+              <a:t>16/02/2024</a:t>
             </a:fld>
             <a:endParaRPr lang="en-GB"/>
           </a:p>
@@ -4108,7 +3988,7 @@
           <a:p>
             <a:fld id="{F8A5948D-6B6B-4AEB-B022-F2A9ADD6F77D}" type="datetimeFigureOut">
               <a:rPr lang="en-GB" smtClean="0"/>
-              <a:t>07/02/2024</a:t>
+              <a:t>16/02/2024</a:t>
             </a:fld>
             <a:endParaRPr lang="en-GB"/>
           </a:p>
@@ -4318,7 +4198,7 @@
           <a:p>
             <a:fld id="{F8A5948D-6B6B-4AEB-B022-F2A9ADD6F77D}" type="datetimeFigureOut">
               <a:rPr lang="en-GB" smtClean="0"/>
-              <a:t>07/02/2024</a:t>
+              <a:t>16/02/2024</a:t>
             </a:fld>
             <a:endParaRPr lang="en-GB"/>
           </a:p>
@@ -5752,7 +5632,7 @@
           <a:p>
             <a:fld id="{F8A5948D-6B6B-4AEB-B022-F2A9ADD6F77D}" type="datetimeFigureOut">
               <a:rPr lang="en-GB" smtClean="0"/>
-              <a:t>07/02/2024</a:t>
+              <a:t>16/02/2024</a:t>
             </a:fld>
             <a:endParaRPr lang="en-GB"/>
           </a:p>
@@ -6434,7 +6314,7 @@
           <a:p>
             <a:fld id="{F8A5948D-6B6B-4AEB-B022-F2A9ADD6F77D}" type="datetimeFigureOut">
               <a:rPr lang="en-GB" smtClean="0"/>
-              <a:t>07/02/2024</a:t>
+              <a:t>16/02/2024</a:t>
             </a:fld>
             <a:endParaRPr lang="en-GB"/>
           </a:p>
@@ -6702,7 +6582,7 @@
           <a:p>
             <a:fld id="{F8A5948D-6B6B-4AEB-B022-F2A9ADD6F77D}" type="datetimeFigureOut">
               <a:rPr lang="en-GB" smtClean="0"/>
-              <a:t>07/02/2024</a:t>
+              <a:t>16/02/2024</a:t>
             </a:fld>
             <a:endParaRPr lang="en-GB"/>
           </a:p>
@@ -7117,7 +6997,7 @@
           <a:p>
             <a:fld id="{F8A5948D-6B6B-4AEB-B022-F2A9ADD6F77D}" type="datetimeFigureOut">
               <a:rPr lang="en-GB" smtClean="0"/>
-              <a:t>07/02/2024</a:t>
+              <a:t>16/02/2024</a:t>
             </a:fld>
             <a:endParaRPr lang="en-GB"/>
           </a:p>
@@ -7259,7 +7139,7 @@
           <a:p>
             <a:fld id="{F8A5948D-6B6B-4AEB-B022-F2A9ADD6F77D}" type="datetimeFigureOut">
               <a:rPr lang="en-GB" smtClean="0"/>
-              <a:t>07/02/2024</a:t>
+              <a:t>16/02/2024</a:t>
             </a:fld>
             <a:endParaRPr lang="en-GB"/>
           </a:p>
@@ -7372,7 +7252,7 @@
           <a:p>
             <a:fld id="{F8A5948D-6B6B-4AEB-B022-F2A9ADD6F77D}" type="datetimeFigureOut">
               <a:rPr lang="en-GB" smtClean="0"/>
-              <a:t>07/02/2024</a:t>
+              <a:t>16/02/2024</a:t>
             </a:fld>
             <a:endParaRPr lang="en-GB"/>
           </a:p>
@@ -7685,7 +7565,7 @@
           <a:p>
             <a:fld id="{F8A5948D-6B6B-4AEB-B022-F2A9ADD6F77D}" type="datetimeFigureOut">
               <a:rPr lang="en-GB" smtClean="0"/>
-              <a:t>07/02/2024</a:t>
+              <a:t>16/02/2024</a:t>
             </a:fld>
             <a:endParaRPr lang="en-GB"/>
           </a:p>
@@ -7974,7 +7854,7 @@
           <a:p>
             <a:fld id="{F8A5948D-6B6B-4AEB-B022-F2A9ADD6F77D}" type="datetimeFigureOut">
               <a:rPr lang="en-GB" smtClean="0"/>
-              <a:t>07/02/2024</a:t>
+              <a:t>16/02/2024</a:t>
             </a:fld>
             <a:endParaRPr lang="en-GB"/>
           </a:p>
@@ -8217,7 +8097,7 @@
           <a:p>
             <a:fld id="{F8A5948D-6B6B-4AEB-B022-F2A9ADD6F77D}" type="datetimeFigureOut">
               <a:rPr lang="en-GB" smtClean="0"/>
-              <a:t>07/02/2024</a:t>
+              <a:t>16/02/2024</a:t>
             </a:fld>
             <a:endParaRPr lang="en-GB"/>
           </a:p>
@@ -11848,8 +11728,8 @@
         </p:nvSpPr>
         <p:spPr bwMode="auto">
           <a:xfrm>
-            <a:off x="1604367" y="794742"/>
-            <a:ext cx="9001125" cy="5715000"/>
+            <a:off x="418886" y="794742"/>
+            <a:ext cx="11773113" cy="5715000"/>
           </a:xfrm>
           <a:prstGeom prst="rect">
             <a:avLst/>
@@ -12139,7 +12019,7 @@
                 <a:cs typeface="Arial" charset="0"/>
                 <a:sym typeface="Arial" charset="0"/>
               </a:rPr>
-              <a:t>Input sound will appear at tap output before total delay time (except last, rightmost tap)</a:t>
+              <a:t>Input appears at tap output before total delay time (except last, rightmost tap)</a:t>
             </a:r>
           </a:p>
         </p:txBody>
@@ -24344,3814 +24224,6 @@
             </a:r>
             <a:r>
               <a:rPr lang="en-GB" dirty="0"/>
-              <a:t> 2 – apply effects to each cannel </a:t>
-            </a:r>
-          </a:p>
-        </p:txBody>
-      </p:sp>
-      <p:sp>
-        <p:nvSpPr>
-          <p:cNvPr id="10" name="TextBox 9">
-            <a:extLst>
-              <a:ext uri="{FF2B5EF4-FFF2-40B4-BE49-F238E27FC236}">
-                <a16:creationId xmlns:a16="http://schemas.microsoft.com/office/drawing/2014/main" id="{D97B1AAE-913C-6F01-8193-03F17736D115}"/>
-              </a:ext>
-            </a:extLst>
-          </p:cNvPr>
-          <p:cNvSpPr txBox="1"/>
-          <p:nvPr/>
-        </p:nvSpPr>
-        <p:spPr>
-          <a:xfrm>
-            <a:off x="93785" y="1337020"/>
-            <a:ext cx="12045461" cy="5193729"/>
-          </a:xfrm>
-          <a:prstGeom prst="rect">
-            <a:avLst/>
-          </a:prstGeom>
-          <a:noFill/>
-          <a:ln w="19050">
-            <a:solidFill>
-              <a:srgbClr val="FF0000"/>
-            </a:solidFill>
-          </a:ln>
-        </p:spPr>
-        <p:txBody>
-          <a:bodyPr wrap="square" rtlCol="0">
-            <a:spAutoFit/>
-          </a:bodyPr>
-          <a:lstStyle/>
-          <a:p>
-            <a:r>
-              <a:rPr lang="en-GB" sz="1650" dirty="0">
-                <a:solidFill>
-                  <a:srgbClr val="0000FF"/>
-                </a:solidFill>
-                <a:latin typeface="Cascadia Mono" panose="020B0609020000020004" pitchFamily="49" charset="0"/>
-              </a:rPr>
-              <a:t>for</a:t>
-            </a:r>
-            <a:r>
-              <a:rPr lang="en-GB" sz="1650" dirty="0">
-                <a:solidFill>
-                  <a:srgbClr val="000000"/>
-                </a:solidFill>
-                <a:latin typeface="Cascadia Mono" panose="020B0609020000020004" pitchFamily="49" charset="0"/>
-              </a:rPr>
-              <a:t> (channel = 0; channel &lt; </a:t>
-            </a:r>
-            <a:r>
-              <a:rPr lang="en-GB" sz="1650" dirty="0" err="1">
-                <a:solidFill>
-                  <a:srgbClr val="000000"/>
-                </a:solidFill>
-                <a:latin typeface="Cascadia Mono" panose="020B0609020000020004" pitchFamily="49" charset="0"/>
-              </a:rPr>
-              <a:t>numInputChannels</a:t>
-            </a:r>
-            <a:r>
-              <a:rPr lang="en-GB" sz="1650" dirty="0">
-                <a:solidFill>
-                  <a:srgbClr val="000000"/>
-                </a:solidFill>
-                <a:latin typeface="Cascadia Mono" panose="020B0609020000020004" pitchFamily="49" charset="0"/>
-              </a:rPr>
-              <a:t>; ++channel) {</a:t>
-            </a:r>
-          </a:p>
-          <a:p>
-            <a:r>
-              <a:rPr lang="en-GB" sz="1650" dirty="0">
-                <a:solidFill>
-                  <a:srgbClr val="000000"/>
-                </a:solidFill>
-                <a:latin typeface="Cascadia Mono" panose="020B0609020000020004" pitchFamily="49" charset="0"/>
-              </a:rPr>
-              <a:t>  </a:t>
-            </a:r>
-            <a:r>
-              <a:rPr lang="en-GB" sz="1650" dirty="0">
-                <a:solidFill>
-                  <a:srgbClr val="0000FF"/>
-                </a:solidFill>
-                <a:latin typeface="Cascadia Mono" panose="020B0609020000020004" pitchFamily="49" charset="0"/>
-              </a:rPr>
-              <a:t>float</a:t>
-            </a:r>
-            <a:r>
-              <a:rPr lang="en-GB" sz="1650" dirty="0">
-                <a:solidFill>
-                  <a:srgbClr val="000000"/>
-                </a:solidFill>
-                <a:latin typeface="Cascadia Mono" panose="020B0609020000020004" pitchFamily="49" charset="0"/>
-              </a:rPr>
-              <a:t>* </a:t>
-            </a:r>
-            <a:r>
-              <a:rPr lang="en-GB" sz="1650" dirty="0" err="1">
-                <a:solidFill>
-                  <a:srgbClr val="000000"/>
-                </a:solidFill>
-                <a:latin typeface="Cascadia Mono" panose="020B0609020000020004" pitchFamily="49" charset="0"/>
-              </a:rPr>
-              <a:t>channelData</a:t>
-            </a:r>
-            <a:r>
-              <a:rPr lang="en-GB" sz="1650" dirty="0">
-                <a:solidFill>
-                  <a:srgbClr val="000000"/>
-                </a:solidFill>
-                <a:latin typeface="Cascadia Mono" panose="020B0609020000020004" pitchFamily="49" charset="0"/>
-              </a:rPr>
-              <a:t> = </a:t>
-            </a:r>
-            <a:r>
-              <a:rPr lang="en-GB" sz="1650" dirty="0" err="1">
-                <a:solidFill>
-                  <a:srgbClr val="808080"/>
-                </a:solidFill>
-                <a:latin typeface="Cascadia Mono" panose="020B0609020000020004" pitchFamily="49" charset="0"/>
-              </a:rPr>
-              <a:t>buffer</a:t>
-            </a:r>
-            <a:r>
-              <a:rPr lang="en-GB" sz="1650" dirty="0" err="1">
-                <a:solidFill>
-                  <a:srgbClr val="000000"/>
-                </a:solidFill>
-                <a:latin typeface="Cascadia Mono" panose="020B0609020000020004" pitchFamily="49" charset="0"/>
-              </a:rPr>
-              <a:t>.getWritePointer</a:t>
-            </a:r>
-            <a:r>
-              <a:rPr lang="en-GB" sz="1650" dirty="0">
-                <a:solidFill>
-                  <a:srgbClr val="000000"/>
-                </a:solidFill>
-                <a:latin typeface="Cascadia Mono" panose="020B0609020000020004" pitchFamily="49" charset="0"/>
-              </a:rPr>
-              <a:t>(channel);</a:t>
-            </a:r>
-          </a:p>
-          <a:p>
-            <a:endParaRPr lang="en-GB" sz="800" dirty="0">
-              <a:solidFill>
-                <a:srgbClr val="000000"/>
-              </a:solidFill>
-              <a:latin typeface="Cascadia Mono" panose="020B0609020000020004" pitchFamily="49" charset="0"/>
-            </a:endParaRPr>
-          </a:p>
-          <a:p>
-            <a:r>
-              <a:rPr lang="en-GB" sz="1650" dirty="0">
-                <a:solidFill>
-                  <a:srgbClr val="0000FF"/>
-                </a:solidFill>
-                <a:latin typeface="Cascadia Mono" panose="020B0609020000020004" pitchFamily="49" charset="0"/>
-              </a:rPr>
-              <a:t>  float</a:t>
-            </a:r>
-            <a:r>
-              <a:rPr lang="en-GB" sz="1650" dirty="0">
-                <a:solidFill>
-                  <a:srgbClr val="000000"/>
-                </a:solidFill>
-                <a:latin typeface="Cascadia Mono" panose="020B0609020000020004" pitchFamily="49" charset="0"/>
-              </a:rPr>
-              <a:t>* </a:t>
-            </a:r>
-            <a:r>
-              <a:rPr lang="en-GB" sz="1650" dirty="0" err="1">
-                <a:solidFill>
-                  <a:srgbClr val="000000"/>
-                </a:solidFill>
-                <a:latin typeface="Cascadia Mono" panose="020B0609020000020004" pitchFamily="49" charset="0"/>
-              </a:rPr>
-              <a:t>delayData</a:t>
-            </a:r>
-            <a:r>
-              <a:rPr lang="en-GB" sz="1650" dirty="0">
-                <a:solidFill>
-                  <a:srgbClr val="000000"/>
-                </a:solidFill>
-                <a:latin typeface="Cascadia Mono" panose="020B0609020000020004" pitchFamily="49" charset="0"/>
-              </a:rPr>
-              <a:t> = </a:t>
-            </a:r>
-            <a:r>
-              <a:rPr lang="en-GB" sz="1650" dirty="0" err="1">
-                <a:solidFill>
-                  <a:srgbClr val="000000"/>
-                </a:solidFill>
-                <a:latin typeface="Cascadia Mono" panose="020B0609020000020004" pitchFamily="49" charset="0"/>
-              </a:rPr>
-              <a:t>delayBuffer.getWritePointer</a:t>
-            </a:r>
-            <a:r>
-              <a:rPr lang="en-GB" sz="1650" dirty="0">
-                <a:solidFill>
-                  <a:srgbClr val="000000"/>
-                </a:solidFill>
-                <a:latin typeface="Cascadia Mono" panose="020B0609020000020004" pitchFamily="49" charset="0"/>
-              </a:rPr>
-              <a:t>(</a:t>
-            </a:r>
-            <a:r>
-              <a:rPr lang="en-GB" sz="1650" dirty="0" err="1">
-                <a:solidFill>
-                  <a:srgbClr val="000000"/>
-                </a:solidFill>
-                <a:latin typeface="Cascadia Mono" panose="020B0609020000020004" pitchFamily="49" charset="0"/>
-              </a:rPr>
-              <a:t>jmin</a:t>
-            </a:r>
-            <a:r>
-              <a:rPr lang="en-GB" sz="1650" dirty="0">
-                <a:solidFill>
-                  <a:srgbClr val="000000"/>
-                </a:solidFill>
-                <a:latin typeface="Cascadia Mono" panose="020B0609020000020004" pitchFamily="49" charset="0"/>
-              </a:rPr>
-              <a:t>(</a:t>
-            </a:r>
-            <a:r>
-              <a:rPr lang="en-GB" sz="1650" dirty="0" err="1">
-                <a:solidFill>
-                  <a:srgbClr val="000000"/>
-                </a:solidFill>
-                <a:latin typeface="Cascadia Mono" panose="020B0609020000020004" pitchFamily="49" charset="0"/>
-              </a:rPr>
-              <a:t>channel,delayBuffer.getNumChannels</a:t>
-            </a:r>
-            <a:r>
-              <a:rPr lang="en-GB" sz="1650" dirty="0">
-                <a:solidFill>
-                  <a:srgbClr val="000000"/>
-                </a:solidFill>
-                <a:latin typeface="Cascadia Mono" panose="020B0609020000020004" pitchFamily="49" charset="0"/>
-              </a:rPr>
-              <a:t>() -1));</a:t>
-            </a:r>
-          </a:p>
-          <a:p>
-            <a:endParaRPr lang="en-GB" sz="800" dirty="0">
-              <a:solidFill>
-                <a:srgbClr val="000000"/>
-              </a:solidFill>
-              <a:latin typeface="Cascadia Mono" panose="020B0609020000020004" pitchFamily="49" charset="0"/>
-            </a:endParaRPr>
-          </a:p>
-          <a:p>
-            <a:r>
-              <a:rPr lang="en-GB" sz="1650" dirty="0">
-                <a:solidFill>
-                  <a:srgbClr val="000000"/>
-                </a:solidFill>
-                <a:latin typeface="Cascadia Mono" panose="020B0609020000020004" pitchFamily="49" charset="0"/>
-              </a:rPr>
-              <a:t>  </a:t>
-            </a:r>
-            <a:r>
-              <a:rPr lang="en-GB" sz="1650" dirty="0" err="1">
-                <a:solidFill>
-                  <a:srgbClr val="000000"/>
-                </a:solidFill>
-                <a:latin typeface="Cascadia Mono" panose="020B0609020000020004" pitchFamily="49" charset="0"/>
-              </a:rPr>
-              <a:t>dpr</a:t>
-            </a:r>
-            <a:r>
-              <a:rPr lang="en-GB" sz="1650" dirty="0">
-                <a:solidFill>
-                  <a:srgbClr val="000000"/>
-                </a:solidFill>
-                <a:latin typeface="Cascadia Mono" panose="020B0609020000020004" pitchFamily="49" charset="0"/>
-              </a:rPr>
-              <a:t> = </a:t>
-            </a:r>
-            <a:r>
-              <a:rPr lang="en-GB" sz="1650" dirty="0" err="1">
-                <a:solidFill>
-                  <a:srgbClr val="000000"/>
-                </a:solidFill>
-                <a:latin typeface="Cascadia Mono" panose="020B0609020000020004" pitchFamily="49" charset="0"/>
-              </a:rPr>
-              <a:t>delayReadPosition</a:t>
-            </a:r>
-            <a:r>
-              <a:rPr lang="en-GB" sz="1650" dirty="0">
-                <a:solidFill>
-                  <a:srgbClr val="000000"/>
-                </a:solidFill>
-                <a:latin typeface="Cascadia Mono" panose="020B0609020000020004" pitchFamily="49" charset="0"/>
-              </a:rPr>
-              <a:t>;</a:t>
-            </a:r>
-          </a:p>
-          <a:p>
-            <a:r>
-              <a:rPr lang="en-GB" sz="1650" dirty="0">
-                <a:solidFill>
-                  <a:srgbClr val="000000"/>
-                </a:solidFill>
-                <a:latin typeface="Cascadia Mono" panose="020B0609020000020004" pitchFamily="49" charset="0"/>
-              </a:rPr>
-              <a:t>  </a:t>
-            </a:r>
-            <a:r>
-              <a:rPr lang="en-GB" sz="1650" dirty="0" err="1">
-                <a:solidFill>
-                  <a:srgbClr val="000000"/>
-                </a:solidFill>
-                <a:latin typeface="Cascadia Mono" panose="020B0609020000020004" pitchFamily="49" charset="0"/>
-              </a:rPr>
-              <a:t>dpw</a:t>
-            </a:r>
-            <a:r>
-              <a:rPr lang="en-GB" sz="1650" dirty="0">
-                <a:solidFill>
-                  <a:srgbClr val="000000"/>
-                </a:solidFill>
-                <a:latin typeface="Cascadia Mono" panose="020B0609020000020004" pitchFamily="49" charset="0"/>
-              </a:rPr>
-              <a:t> = </a:t>
-            </a:r>
-            <a:r>
-              <a:rPr lang="en-GB" sz="1650" dirty="0" err="1">
-                <a:solidFill>
-                  <a:srgbClr val="000000"/>
-                </a:solidFill>
-                <a:latin typeface="Cascadia Mono" panose="020B0609020000020004" pitchFamily="49" charset="0"/>
-              </a:rPr>
-              <a:t>delayWritePosition</a:t>
-            </a:r>
-            <a:r>
-              <a:rPr lang="en-GB" sz="1650" dirty="0">
-                <a:solidFill>
-                  <a:srgbClr val="000000"/>
-                </a:solidFill>
-                <a:latin typeface="Cascadia Mono" panose="020B0609020000020004" pitchFamily="49" charset="0"/>
-              </a:rPr>
-              <a:t>;</a:t>
-            </a:r>
-          </a:p>
-          <a:p>
-            <a:endParaRPr lang="en-GB" sz="800" dirty="0">
-              <a:solidFill>
-                <a:srgbClr val="000000"/>
-              </a:solidFill>
-              <a:latin typeface="Cascadia Mono" panose="020B0609020000020004" pitchFamily="49" charset="0"/>
-            </a:endParaRPr>
-          </a:p>
-          <a:p>
-            <a:r>
-              <a:rPr lang="en-GB" sz="1650" dirty="0">
-                <a:solidFill>
-                  <a:srgbClr val="000000"/>
-                </a:solidFill>
-                <a:latin typeface="Cascadia Mono" panose="020B0609020000020004" pitchFamily="49" charset="0"/>
-              </a:rPr>
-              <a:t>  </a:t>
-            </a:r>
-            <a:r>
-              <a:rPr lang="en-GB" sz="1650" dirty="0">
-                <a:solidFill>
-                  <a:srgbClr val="0000FF"/>
-                </a:solidFill>
-                <a:latin typeface="Cascadia Mono" panose="020B0609020000020004" pitchFamily="49" charset="0"/>
-              </a:rPr>
-              <a:t>for</a:t>
-            </a:r>
-            <a:r>
-              <a:rPr lang="en-GB" sz="1650" dirty="0">
-                <a:solidFill>
-                  <a:srgbClr val="000000"/>
-                </a:solidFill>
-                <a:latin typeface="Cascadia Mono" panose="020B0609020000020004" pitchFamily="49" charset="0"/>
-              </a:rPr>
-              <a:t> (</a:t>
-            </a:r>
-            <a:r>
-              <a:rPr lang="en-GB" sz="1650" dirty="0">
-                <a:solidFill>
-                  <a:srgbClr val="0000FF"/>
-                </a:solidFill>
-                <a:latin typeface="Cascadia Mono" panose="020B0609020000020004" pitchFamily="49" charset="0"/>
-              </a:rPr>
-              <a:t>int</a:t>
-            </a:r>
-            <a:r>
-              <a:rPr lang="en-GB" sz="1650" dirty="0">
-                <a:solidFill>
-                  <a:srgbClr val="000000"/>
-                </a:solidFill>
-                <a:latin typeface="Cascadia Mono" panose="020B0609020000020004" pitchFamily="49" charset="0"/>
-              </a:rPr>
-              <a:t> </a:t>
-            </a:r>
-            <a:r>
-              <a:rPr lang="en-GB" sz="1650" dirty="0" err="1">
-                <a:solidFill>
-                  <a:srgbClr val="000000"/>
-                </a:solidFill>
-                <a:latin typeface="Cascadia Mono" panose="020B0609020000020004" pitchFamily="49" charset="0"/>
-              </a:rPr>
-              <a:t>i</a:t>
-            </a:r>
-            <a:r>
-              <a:rPr lang="en-GB" sz="1650" dirty="0">
-                <a:solidFill>
-                  <a:srgbClr val="000000"/>
-                </a:solidFill>
-                <a:latin typeface="Cascadia Mono" panose="020B0609020000020004" pitchFamily="49" charset="0"/>
-              </a:rPr>
-              <a:t> = 0; </a:t>
-            </a:r>
-            <a:r>
-              <a:rPr lang="en-GB" sz="1650" dirty="0" err="1">
-                <a:solidFill>
-                  <a:srgbClr val="000000"/>
-                </a:solidFill>
-                <a:latin typeface="Cascadia Mono" panose="020B0609020000020004" pitchFamily="49" charset="0"/>
-              </a:rPr>
-              <a:t>i</a:t>
-            </a:r>
-            <a:r>
-              <a:rPr lang="en-GB" sz="1650" dirty="0">
-                <a:solidFill>
-                  <a:srgbClr val="000000"/>
-                </a:solidFill>
-                <a:latin typeface="Cascadia Mono" panose="020B0609020000020004" pitchFamily="49" charset="0"/>
-              </a:rPr>
-              <a:t> &lt; </a:t>
-            </a:r>
-            <a:r>
-              <a:rPr lang="en-GB" sz="1650" dirty="0" err="1">
-                <a:solidFill>
-                  <a:srgbClr val="000000"/>
-                </a:solidFill>
-                <a:latin typeface="Cascadia Mono" panose="020B0609020000020004" pitchFamily="49" charset="0"/>
-              </a:rPr>
-              <a:t>numSamples</a:t>
-            </a:r>
-            <a:r>
-              <a:rPr lang="en-GB" sz="1650" dirty="0">
-                <a:solidFill>
-                  <a:srgbClr val="000000"/>
-                </a:solidFill>
-                <a:latin typeface="Cascadia Mono" panose="020B0609020000020004" pitchFamily="49" charset="0"/>
-              </a:rPr>
-              <a:t>; ++</a:t>
-            </a:r>
-            <a:r>
-              <a:rPr lang="en-GB" sz="1650" dirty="0" err="1">
-                <a:solidFill>
-                  <a:srgbClr val="000000"/>
-                </a:solidFill>
-                <a:latin typeface="Cascadia Mono" panose="020B0609020000020004" pitchFamily="49" charset="0"/>
-              </a:rPr>
-              <a:t>i</a:t>
-            </a:r>
-            <a:r>
-              <a:rPr lang="en-GB" sz="1650" dirty="0">
-                <a:solidFill>
-                  <a:srgbClr val="000000"/>
-                </a:solidFill>
-                <a:latin typeface="Cascadia Mono" panose="020B0609020000020004" pitchFamily="49" charset="0"/>
-              </a:rPr>
-              <a:t>) {</a:t>
-            </a:r>
-          </a:p>
-          <a:p>
-            <a:r>
-              <a:rPr lang="en-GB" sz="1650" dirty="0">
-                <a:solidFill>
-                  <a:srgbClr val="000000"/>
-                </a:solidFill>
-                <a:latin typeface="Cascadia Mono" panose="020B0609020000020004" pitchFamily="49" charset="0"/>
-              </a:rPr>
-              <a:t>    </a:t>
-            </a:r>
-            <a:r>
-              <a:rPr lang="en-GB" sz="1650" dirty="0">
-                <a:solidFill>
-                  <a:srgbClr val="0000FF"/>
-                </a:solidFill>
-                <a:latin typeface="Cascadia Mono" panose="020B0609020000020004" pitchFamily="49" charset="0"/>
-              </a:rPr>
-              <a:t>float</a:t>
-            </a:r>
-            <a:r>
-              <a:rPr lang="en-GB" sz="1650" dirty="0">
-                <a:solidFill>
-                  <a:srgbClr val="000000"/>
-                </a:solidFill>
-                <a:latin typeface="Cascadia Mono" panose="020B0609020000020004" pitchFamily="49" charset="0"/>
-              </a:rPr>
-              <a:t> in = </a:t>
-            </a:r>
-            <a:r>
-              <a:rPr lang="en-GB" sz="1650" dirty="0" err="1">
-                <a:solidFill>
-                  <a:srgbClr val="000000"/>
-                </a:solidFill>
-                <a:latin typeface="Cascadia Mono" panose="020B0609020000020004" pitchFamily="49" charset="0"/>
-              </a:rPr>
-              <a:t>channelData</a:t>
-            </a:r>
-            <a:r>
-              <a:rPr lang="en-GB" sz="1650" dirty="0">
-                <a:solidFill>
-                  <a:srgbClr val="000000"/>
-                </a:solidFill>
-                <a:latin typeface="Cascadia Mono" panose="020B0609020000020004" pitchFamily="49" charset="0"/>
-              </a:rPr>
-              <a:t>[</a:t>
-            </a:r>
-            <a:r>
-              <a:rPr lang="en-GB" sz="1650" dirty="0" err="1">
-                <a:solidFill>
-                  <a:srgbClr val="000000"/>
-                </a:solidFill>
-                <a:latin typeface="Cascadia Mono" panose="020B0609020000020004" pitchFamily="49" charset="0"/>
-              </a:rPr>
-              <a:t>i</a:t>
-            </a:r>
-            <a:r>
-              <a:rPr lang="en-GB" sz="1650" dirty="0">
-                <a:solidFill>
-                  <a:srgbClr val="000000"/>
-                </a:solidFill>
-                <a:latin typeface="Cascadia Mono" panose="020B0609020000020004" pitchFamily="49" charset="0"/>
-              </a:rPr>
-              <a:t>];</a:t>
-            </a:r>
-          </a:p>
-          <a:p>
-            <a:r>
-              <a:rPr lang="en-GB" sz="1650" dirty="0">
-                <a:solidFill>
-                  <a:srgbClr val="0000FF"/>
-                </a:solidFill>
-                <a:latin typeface="Cascadia Mono" panose="020B0609020000020004" pitchFamily="49" charset="0"/>
-              </a:rPr>
-              <a:t>    float</a:t>
-            </a:r>
-            <a:r>
-              <a:rPr lang="en-GB" sz="1650" dirty="0">
-                <a:solidFill>
-                  <a:srgbClr val="000000"/>
-                </a:solidFill>
-                <a:latin typeface="Cascadia Mono" panose="020B0609020000020004" pitchFamily="49" charset="0"/>
-              </a:rPr>
-              <a:t> out = (1- </a:t>
-            </a:r>
-            <a:r>
-              <a:rPr lang="en-GB" sz="1650" dirty="0" err="1">
-                <a:solidFill>
-                  <a:srgbClr val="000000"/>
-                </a:solidFill>
-                <a:latin typeface="Cascadia Mono" panose="020B0609020000020004" pitchFamily="49" charset="0"/>
-              </a:rPr>
-              <a:t>dryWetMix</a:t>
-            </a:r>
-            <a:r>
-              <a:rPr lang="en-GB" sz="1650" dirty="0">
-                <a:solidFill>
-                  <a:srgbClr val="000000"/>
-                </a:solidFill>
-                <a:latin typeface="Cascadia Mono" panose="020B0609020000020004" pitchFamily="49" charset="0"/>
-              </a:rPr>
-              <a:t>) * in + </a:t>
-            </a:r>
-            <a:r>
-              <a:rPr lang="en-GB" sz="1650" dirty="0" err="1">
-                <a:solidFill>
-                  <a:srgbClr val="000000"/>
-                </a:solidFill>
-                <a:latin typeface="Cascadia Mono" panose="020B0609020000020004" pitchFamily="49" charset="0"/>
-              </a:rPr>
-              <a:t>dryWetMix</a:t>
-            </a:r>
-            <a:r>
-              <a:rPr lang="en-GB" sz="1650" dirty="0">
-                <a:solidFill>
-                  <a:srgbClr val="000000"/>
-                </a:solidFill>
-                <a:latin typeface="Cascadia Mono" panose="020B0609020000020004" pitchFamily="49" charset="0"/>
-              </a:rPr>
-              <a:t> * </a:t>
-            </a:r>
-            <a:r>
-              <a:rPr lang="en-GB" sz="1650" dirty="0" err="1">
-                <a:solidFill>
-                  <a:srgbClr val="000000"/>
-                </a:solidFill>
-                <a:latin typeface="Cascadia Mono" panose="020B0609020000020004" pitchFamily="49" charset="0"/>
-              </a:rPr>
-              <a:t>delayData</a:t>
-            </a:r>
-            <a:r>
-              <a:rPr lang="en-GB" sz="1650" dirty="0">
-                <a:solidFill>
-                  <a:srgbClr val="000000"/>
-                </a:solidFill>
-                <a:latin typeface="Cascadia Mono" panose="020B0609020000020004" pitchFamily="49" charset="0"/>
-              </a:rPr>
-              <a:t>[</a:t>
-            </a:r>
-            <a:r>
-              <a:rPr lang="en-GB" sz="1650" dirty="0" err="1">
-                <a:solidFill>
-                  <a:srgbClr val="000000"/>
-                </a:solidFill>
-                <a:latin typeface="Cascadia Mono" panose="020B0609020000020004" pitchFamily="49" charset="0"/>
-              </a:rPr>
-              <a:t>dpr</a:t>
-            </a:r>
-            <a:r>
-              <a:rPr lang="en-GB" sz="1650" dirty="0">
-                <a:solidFill>
-                  <a:srgbClr val="000000"/>
-                </a:solidFill>
-                <a:latin typeface="Cascadia Mono" panose="020B0609020000020004" pitchFamily="49" charset="0"/>
-              </a:rPr>
-              <a:t>];</a:t>
-            </a:r>
-          </a:p>
-          <a:p>
-            <a:endParaRPr lang="en-GB" sz="800" dirty="0">
-              <a:solidFill>
-                <a:srgbClr val="000000"/>
-              </a:solidFill>
-              <a:latin typeface="Cascadia Mono" panose="020B0609020000020004" pitchFamily="49" charset="0"/>
-            </a:endParaRPr>
-          </a:p>
-          <a:p>
-            <a:r>
-              <a:rPr lang="en-GB" sz="1650" dirty="0">
-                <a:solidFill>
-                  <a:srgbClr val="008000"/>
-                </a:solidFill>
-                <a:latin typeface="Cascadia Mono" panose="020B0609020000020004" pitchFamily="49" charset="0"/>
-              </a:rPr>
-              <a:t>    </a:t>
-            </a:r>
-            <a:r>
-              <a:rPr lang="en-GB" sz="1650" dirty="0" err="1">
-                <a:solidFill>
-                  <a:srgbClr val="000000"/>
-                </a:solidFill>
-                <a:latin typeface="Cascadia Mono" panose="020B0609020000020004" pitchFamily="49" charset="0"/>
-              </a:rPr>
-              <a:t>delayData</a:t>
-            </a:r>
-            <a:r>
-              <a:rPr lang="en-GB" sz="1650" dirty="0">
-                <a:solidFill>
-                  <a:srgbClr val="000000"/>
-                </a:solidFill>
-                <a:latin typeface="Cascadia Mono" panose="020B0609020000020004" pitchFamily="49" charset="0"/>
-              </a:rPr>
-              <a:t>[</a:t>
-            </a:r>
-            <a:r>
-              <a:rPr lang="en-GB" sz="1650" dirty="0" err="1">
-                <a:solidFill>
-                  <a:srgbClr val="000000"/>
-                </a:solidFill>
-                <a:latin typeface="Cascadia Mono" panose="020B0609020000020004" pitchFamily="49" charset="0"/>
-              </a:rPr>
-              <a:t>dpw</a:t>
-            </a:r>
-            <a:r>
-              <a:rPr lang="en-GB" sz="1650" dirty="0">
-                <a:solidFill>
-                  <a:srgbClr val="000000"/>
-                </a:solidFill>
-                <a:latin typeface="Cascadia Mono" panose="020B0609020000020004" pitchFamily="49" charset="0"/>
-              </a:rPr>
-              <a:t>] = in + (</a:t>
-            </a:r>
-            <a:r>
-              <a:rPr lang="en-GB" sz="1650" dirty="0" err="1">
-                <a:solidFill>
-                  <a:srgbClr val="000000"/>
-                </a:solidFill>
-                <a:latin typeface="Cascadia Mono" panose="020B0609020000020004" pitchFamily="49" charset="0"/>
-              </a:rPr>
-              <a:t>delayData</a:t>
-            </a:r>
-            <a:r>
-              <a:rPr lang="en-GB" sz="1650" dirty="0">
-                <a:solidFill>
-                  <a:srgbClr val="000000"/>
-                </a:solidFill>
-                <a:latin typeface="Cascadia Mono" panose="020B0609020000020004" pitchFamily="49" charset="0"/>
-              </a:rPr>
-              <a:t>[</a:t>
-            </a:r>
-            <a:r>
-              <a:rPr lang="en-GB" sz="1650" dirty="0" err="1">
-                <a:solidFill>
-                  <a:srgbClr val="000000"/>
-                </a:solidFill>
-                <a:latin typeface="Cascadia Mono" panose="020B0609020000020004" pitchFamily="49" charset="0"/>
-              </a:rPr>
-              <a:t>dpr</a:t>
-            </a:r>
-            <a:r>
-              <a:rPr lang="en-GB" sz="1650" dirty="0">
-                <a:solidFill>
-                  <a:srgbClr val="000000"/>
-                </a:solidFill>
-                <a:latin typeface="Cascadia Mono" panose="020B0609020000020004" pitchFamily="49" charset="0"/>
-              </a:rPr>
-              <a:t>] * feedback);</a:t>
-            </a:r>
-          </a:p>
-          <a:p>
-            <a:endParaRPr lang="en-GB" sz="800" dirty="0">
-              <a:solidFill>
-                <a:srgbClr val="000000"/>
-              </a:solidFill>
-              <a:latin typeface="Cascadia Mono" panose="020B0609020000020004" pitchFamily="49" charset="0"/>
-            </a:endParaRPr>
-          </a:p>
-          <a:p>
-            <a:r>
-              <a:rPr lang="en-GB" sz="1650" dirty="0">
-                <a:solidFill>
-                  <a:srgbClr val="0000FF"/>
-                </a:solidFill>
-                <a:latin typeface="Cascadia Mono" panose="020B0609020000020004" pitchFamily="49" charset="0"/>
-              </a:rPr>
-              <a:t>    if</a:t>
-            </a:r>
-            <a:r>
-              <a:rPr lang="en-GB" sz="1650" dirty="0">
-                <a:solidFill>
-                  <a:srgbClr val="000000"/>
-                </a:solidFill>
-                <a:latin typeface="Cascadia Mono" panose="020B0609020000020004" pitchFamily="49" charset="0"/>
-              </a:rPr>
-              <a:t> (++</a:t>
-            </a:r>
-            <a:r>
-              <a:rPr lang="en-GB" sz="1650" dirty="0" err="1">
-                <a:solidFill>
-                  <a:srgbClr val="000000"/>
-                </a:solidFill>
-                <a:latin typeface="Cascadia Mono" panose="020B0609020000020004" pitchFamily="49" charset="0"/>
-              </a:rPr>
-              <a:t>dpr</a:t>
-            </a:r>
-            <a:r>
-              <a:rPr lang="en-GB" sz="1650" dirty="0">
-                <a:solidFill>
-                  <a:srgbClr val="000000"/>
-                </a:solidFill>
-                <a:latin typeface="Cascadia Mono" panose="020B0609020000020004" pitchFamily="49" charset="0"/>
-              </a:rPr>
-              <a:t> &gt;= </a:t>
-            </a:r>
-            <a:r>
-              <a:rPr lang="en-GB" sz="1650" dirty="0" err="1">
-                <a:solidFill>
-                  <a:srgbClr val="000000"/>
-                </a:solidFill>
-                <a:latin typeface="Cascadia Mono" panose="020B0609020000020004" pitchFamily="49" charset="0"/>
-              </a:rPr>
-              <a:t>delayBufferLength</a:t>
-            </a:r>
-            <a:r>
-              <a:rPr lang="en-GB" sz="1650" dirty="0">
-                <a:solidFill>
-                  <a:srgbClr val="000000"/>
-                </a:solidFill>
-                <a:latin typeface="Cascadia Mono" panose="020B0609020000020004" pitchFamily="49" charset="0"/>
-              </a:rPr>
-              <a:t>) </a:t>
-            </a:r>
-            <a:r>
-              <a:rPr lang="en-GB" sz="1650" dirty="0" err="1">
-                <a:solidFill>
-                  <a:srgbClr val="000000"/>
-                </a:solidFill>
-                <a:latin typeface="Cascadia Mono" panose="020B0609020000020004" pitchFamily="49" charset="0"/>
-              </a:rPr>
-              <a:t>dpr</a:t>
-            </a:r>
-            <a:r>
-              <a:rPr lang="en-GB" sz="1650" dirty="0">
-                <a:solidFill>
-                  <a:srgbClr val="000000"/>
-                </a:solidFill>
-                <a:latin typeface="Cascadia Mono" panose="020B0609020000020004" pitchFamily="49" charset="0"/>
-              </a:rPr>
-              <a:t> = 0;</a:t>
-            </a:r>
-          </a:p>
-          <a:p>
-            <a:r>
-              <a:rPr lang="en-GB" sz="1650" dirty="0">
-                <a:solidFill>
-                  <a:srgbClr val="0000FF"/>
-                </a:solidFill>
-                <a:latin typeface="Cascadia Mono" panose="020B0609020000020004" pitchFamily="49" charset="0"/>
-              </a:rPr>
-              <a:t>    if</a:t>
-            </a:r>
-            <a:r>
-              <a:rPr lang="en-GB" sz="1650" dirty="0">
-                <a:solidFill>
-                  <a:srgbClr val="000000"/>
-                </a:solidFill>
-                <a:latin typeface="Cascadia Mono" panose="020B0609020000020004" pitchFamily="49" charset="0"/>
-              </a:rPr>
-              <a:t> (++</a:t>
-            </a:r>
-            <a:r>
-              <a:rPr lang="en-GB" sz="1650" dirty="0" err="1">
-                <a:solidFill>
-                  <a:srgbClr val="000000"/>
-                </a:solidFill>
-                <a:latin typeface="Cascadia Mono" panose="020B0609020000020004" pitchFamily="49" charset="0"/>
-              </a:rPr>
-              <a:t>dpw</a:t>
-            </a:r>
-            <a:r>
-              <a:rPr lang="en-GB" sz="1650" dirty="0">
-                <a:solidFill>
-                  <a:srgbClr val="000000"/>
-                </a:solidFill>
-                <a:latin typeface="Cascadia Mono" panose="020B0609020000020004" pitchFamily="49" charset="0"/>
-              </a:rPr>
-              <a:t> &gt;= </a:t>
-            </a:r>
-            <a:r>
-              <a:rPr lang="en-GB" sz="1650" dirty="0" err="1">
-                <a:solidFill>
-                  <a:srgbClr val="000000"/>
-                </a:solidFill>
-                <a:latin typeface="Cascadia Mono" panose="020B0609020000020004" pitchFamily="49" charset="0"/>
-              </a:rPr>
-              <a:t>delayBufferLength</a:t>
-            </a:r>
-            <a:r>
-              <a:rPr lang="en-GB" sz="1650" dirty="0">
-                <a:solidFill>
-                  <a:srgbClr val="000000"/>
-                </a:solidFill>
-                <a:latin typeface="Cascadia Mono" panose="020B0609020000020004" pitchFamily="49" charset="0"/>
-              </a:rPr>
-              <a:t>) </a:t>
-            </a:r>
-            <a:r>
-              <a:rPr lang="en-GB" sz="1650" dirty="0" err="1">
-                <a:solidFill>
-                  <a:srgbClr val="000000"/>
-                </a:solidFill>
-                <a:latin typeface="Cascadia Mono" panose="020B0609020000020004" pitchFamily="49" charset="0"/>
-              </a:rPr>
-              <a:t>dpw</a:t>
-            </a:r>
-            <a:r>
-              <a:rPr lang="en-GB" sz="1650" dirty="0">
-                <a:solidFill>
-                  <a:srgbClr val="000000"/>
-                </a:solidFill>
-                <a:latin typeface="Cascadia Mono" panose="020B0609020000020004" pitchFamily="49" charset="0"/>
-              </a:rPr>
-              <a:t> = 0;</a:t>
-            </a:r>
-          </a:p>
-          <a:p>
-            <a:endParaRPr lang="en-GB" sz="800" dirty="0">
-              <a:solidFill>
-                <a:srgbClr val="000000"/>
-              </a:solidFill>
-              <a:latin typeface="Cascadia Mono" panose="020B0609020000020004" pitchFamily="49" charset="0"/>
-            </a:endParaRPr>
-          </a:p>
-          <a:p>
-            <a:r>
-              <a:rPr lang="en-GB" sz="1650" dirty="0">
-                <a:solidFill>
-                  <a:srgbClr val="000000"/>
-                </a:solidFill>
-                <a:latin typeface="Cascadia Mono" panose="020B0609020000020004" pitchFamily="49" charset="0"/>
-              </a:rPr>
-              <a:t>    </a:t>
-            </a:r>
-            <a:r>
-              <a:rPr lang="en-GB" sz="1650" dirty="0" err="1">
-                <a:solidFill>
-                  <a:srgbClr val="000000"/>
-                </a:solidFill>
-                <a:latin typeface="Cascadia Mono" panose="020B0609020000020004" pitchFamily="49" charset="0"/>
-              </a:rPr>
-              <a:t>channelData</a:t>
-            </a:r>
-            <a:r>
-              <a:rPr lang="en-GB" sz="1650" dirty="0">
-                <a:solidFill>
-                  <a:srgbClr val="000000"/>
-                </a:solidFill>
-                <a:latin typeface="Cascadia Mono" panose="020B0609020000020004" pitchFamily="49" charset="0"/>
-              </a:rPr>
-              <a:t>[</a:t>
-            </a:r>
-            <a:r>
-              <a:rPr lang="en-GB" sz="1650" dirty="0" err="1">
-                <a:solidFill>
-                  <a:srgbClr val="000000"/>
-                </a:solidFill>
-                <a:latin typeface="Cascadia Mono" panose="020B0609020000020004" pitchFamily="49" charset="0"/>
-              </a:rPr>
-              <a:t>i</a:t>
-            </a:r>
-            <a:r>
-              <a:rPr lang="en-GB" sz="1650" dirty="0">
-                <a:solidFill>
-                  <a:srgbClr val="000000"/>
-                </a:solidFill>
-                <a:latin typeface="Cascadia Mono" panose="020B0609020000020004" pitchFamily="49" charset="0"/>
-              </a:rPr>
-              <a:t>] = out;</a:t>
-            </a:r>
-          </a:p>
-          <a:p>
-            <a:r>
-              <a:rPr lang="en-GB" sz="1650" dirty="0">
-                <a:solidFill>
-                  <a:srgbClr val="000000"/>
-                </a:solidFill>
-                <a:latin typeface="Cascadia Mono" panose="020B0609020000020004" pitchFamily="49" charset="0"/>
-              </a:rPr>
-              <a:t>  }</a:t>
-            </a:r>
-          </a:p>
-          <a:p>
-            <a:r>
-              <a:rPr lang="en-GB" sz="1650" dirty="0">
-                <a:solidFill>
-                  <a:srgbClr val="000000"/>
-                </a:solidFill>
-                <a:latin typeface="Cascadia Mono" panose="020B0609020000020004" pitchFamily="49" charset="0"/>
-              </a:rPr>
-              <a:t>}</a:t>
-            </a:r>
-            <a:endParaRPr lang="en-GB" sz="1800" dirty="0">
-              <a:solidFill>
-                <a:srgbClr val="000000"/>
-              </a:solidFill>
-              <a:latin typeface="Cascadia Mono" panose="020B0609020000020004" pitchFamily="49" charset="0"/>
-            </a:endParaRPr>
-          </a:p>
-          <a:p>
-            <a:endParaRPr lang="en-GB" sz="800" dirty="0">
-              <a:solidFill>
-                <a:srgbClr val="000000"/>
-              </a:solidFill>
-              <a:latin typeface="Cascadia Mono" panose="020B0609020000020004" pitchFamily="49" charset="0"/>
-            </a:endParaRPr>
-          </a:p>
-          <a:p>
-            <a:r>
-              <a:rPr lang="en-GB" sz="1650" dirty="0" err="1">
-                <a:solidFill>
-                  <a:srgbClr val="000000"/>
-                </a:solidFill>
-                <a:latin typeface="Cascadia Mono" panose="020B0609020000020004" pitchFamily="49" charset="0"/>
-              </a:rPr>
-              <a:t>delayReadPosition</a:t>
-            </a:r>
-            <a:r>
-              <a:rPr lang="en-GB" sz="1650" dirty="0">
-                <a:solidFill>
-                  <a:srgbClr val="000000"/>
-                </a:solidFill>
-                <a:latin typeface="Cascadia Mono" panose="020B0609020000020004" pitchFamily="49" charset="0"/>
-              </a:rPr>
-              <a:t> = </a:t>
-            </a:r>
-            <a:r>
-              <a:rPr lang="en-GB" sz="1650" dirty="0" err="1">
-                <a:solidFill>
-                  <a:srgbClr val="000000"/>
-                </a:solidFill>
-                <a:latin typeface="Cascadia Mono" panose="020B0609020000020004" pitchFamily="49" charset="0"/>
-              </a:rPr>
-              <a:t>dpr</a:t>
-            </a:r>
-            <a:r>
-              <a:rPr lang="en-GB" sz="1650" dirty="0">
-                <a:solidFill>
-                  <a:srgbClr val="000000"/>
-                </a:solidFill>
-                <a:latin typeface="Cascadia Mono" panose="020B0609020000020004" pitchFamily="49" charset="0"/>
-              </a:rPr>
-              <a:t>;</a:t>
-            </a:r>
-          </a:p>
-          <a:p>
-            <a:r>
-              <a:rPr lang="en-GB" sz="1650" dirty="0" err="1">
-                <a:solidFill>
-                  <a:srgbClr val="000000"/>
-                </a:solidFill>
-                <a:latin typeface="Cascadia Mono" panose="020B0609020000020004" pitchFamily="49" charset="0"/>
-              </a:rPr>
-              <a:t>delayWritePosition</a:t>
-            </a:r>
-            <a:r>
-              <a:rPr lang="en-GB" sz="1650" dirty="0">
-                <a:solidFill>
-                  <a:srgbClr val="000000"/>
-                </a:solidFill>
-                <a:latin typeface="Cascadia Mono" panose="020B0609020000020004" pitchFamily="49" charset="0"/>
-              </a:rPr>
-              <a:t> = </a:t>
-            </a:r>
-            <a:r>
-              <a:rPr lang="en-GB" sz="1650" dirty="0" err="1">
-                <a:solidFill>
-                  <a:srgbClr val="000000"/>
-                </a:solidFill>
-                <a:latin typeface="Cascadia Mono" panose="020B0609020000020004" pitchFamily="49" charset="0"/>
-              </a:rPr>
-              <a:t>dpw</a:t>
-            </a:r>
-            <a:r>
-              <a:rPr lang="en-GB" sz="1650" dirty="0">
-                <a:solidFill>
-                  <a:srgbClr val="000000"/>
-                </a:solidFill>
-                <a:latin typeface="Cascadia Mono" panose="020B0609020000020004" pitchFamily="49" charset="0"/>
-              </a:rPr>
-              <a:t>;</a:t>
-            </a:r>
-          </a:p>
-        </p:txBody>
-      </p:sp>
-      <p:sp>
-        <p:nvSpPr>
-          <p:cNvPr id="4" name="Rectangle 3">
-            <a:extLst>
-              <a:ext uri="{FF2B5EF4-FFF2-40B4-BE49-F238E27FC236}">
-                <a16:creationId xmlns:a16="http://schemas.microsoft.com/office/drawing/2014/main" id="{66B2A15F-606E-B809-8076-828203BCAD55}"/>
-              </a:ext>
-            </a:extLst>
-          </p:cNvPr>
-          <p:cNvSpPr/>
-          <p:nvPr/>
-        </p:nvSpPr>
-        <p:spPr>
-          <a:xfrm>
-            <a:off x="287307" y="1623746"/>
-            <a:ext cx="6769986" cy="318052"/>
-          </a:xfrm>
-          <a:prstGeom prst="rect">
-            <a:avLst/>
-          </a:prstGeom>
-          <a:noFill/>
-          <a:ln w="22225"/>
-        </p:spPr>
-        <p:style>
-          <a:lnRef idx="2">
-            <a:schemeClr val="accent1">
-              <a:shade val="15000"/>
-            </a:schemeClr>
-          </a:lnRef>
-          <a:fillRef idx="1">
-            <a:schemeClr val="accent1"/>
-          </a:fillRef>
-          <a:effectRef idx="0">
-            <a:schemeClr val="accent1"/>
-          </a:effectRef>
-          <a:fontRef idx="minor">
-            <a:schemeClr val="lt1"/>
-          </a:fontRef>
-        </p:style>
-        <p:txBody>
-          <a:bodyPr rtlCol="0" anchor="ctr"/>
-          <a:lstStyle/>
-          <a:p>
-            <a:pPr algn="ctr"/>
-            <a:endParaRPr lang="en-GB" sz="1600"/>
-          </a:p>
-        </p:txBody>
-      </p:sp>
-      <p:cxnSp>
-        <p:nvCxnSpPr>
-          <p:cNvPr id="5" name="Straight Arrow Connector 4">
-            <a:extLst>
-              <a:ext uri="{FF2B5EF4-FFF2-40B4-BE49-F238E27FC236}">
-                <a16:creationId xmlns:a16="http://schemas.microsoft.com/office/drawing/2014/main" id="{E394CAAB-FD8C-5AEA-FF81-D899C1B6637D}"/>
-              </a:ext>
-            </a:extLst>
-          </p:cNvPr>
-          <p:cNvCxnSpPr>
-            <a:cxnSpLocks/>
-            <a:stCxn id="4" idx="3"/>
-          </p:cNvCxnSpPr>
-          <p:nvPr/>
-        </p:nvCxnSpPr>
-        <p:spPr>
-          <a:xfrm flipV="1">
-            <a:off x="7057293" y="824093"/>
-            <a:ext cx="1635369" cy="958679"/>
-          </a:xfrm>
-          <a:prstGeom prst="straightConnector1">
-            <a:avLst/>
-          </a:prstGeom>
-          <a:ln w="25400">
-            <a:headEnd type="arrow" w="lg" len="lg"/>
-            <a:tailEnd type="none"/>
-          </a:ln>
-        </p:spPr>
-        <p:style>
-          <a:lnRef idx="1">
-            <a:schemeClr val="accent1"/>
-          </a:lnRef>
-          <a:fillRef idx="0">
-            <a:schemeClr val="accent1"/>
-          </a:fillRef>
-          <a:effectRef idx="0">
-            <a:schemeClr val="accent1"/>
-          </a:effectRef>
-          <a:fontRef idx="minor">
-            <a:schemeClr val="tx1"/>
-          </a:fontRef>
-        </p:style>
-      </p:cxnSp>
-      <p:sp>
-        <p:nvSpPr>
-          <p:cNvPr id="6" name="TextBox 5">
-            <a:extLst>
-              <a:ext uri="{FF2B5EF4-FFF2-40B4-BE49-F238E27FC236}">
-                <a16:creationId xmlns:a16="http://schemas.microsoft.com/office/drawing/2014/main" id="{E72ABEBF-9117-1B60-1C29-FAF02512F354}"/>
-              </a:ext>
-            </a:extLst>
-          </p:cNvPr>
-          <p:cNvSpPr txBox="1"/>
-          <p:nvPr/>
-        </p:nvSpPr>
-        <p:spPr>
-          <a:xfrm>
-            <a:off x="8692662" y="493601"/>
-            <a:ext cx="3273956" cy="707886"/>
-          </a:xfrm>
-          <a:prstGeom prst="rect">
-            <a:avLst/>
-          </a:prstGeom>
-          <a:solidFill>
-            <a:schemeClr val="bg1"/>
-          </a:solidFill>
-          <a:ln w="25400">
-            <a:solidFill>
-              <a:schemeClr val="accent1"/>
-            </a:solidFill>
-          </a:ln>
-        </p:spPr>
-        <p:txBody>
-          <a:bodyPr wrap="square" rtlCol="0">
-            <a:spAutoFit/>
-          </a:bodyPr>
-          <a:lstStyle/>
-          <a:p>
-            <a:r>
-              <a:rPr lang="en-GB" sz="2000" dirty="0" err="1"/>
-              <a:t>channelData</a:t>
-            </a:r>
-            <a:r>
-              <a:rPr lang="en-GB" sz="2000" dirty="0"/>
-              <a:t> is </a:t>
-            </a:r>
-            <a:r>
-              <a:rPr lang="en-GB" sz="2000" dirty="0" err="1"/>
-              <a:t>numSamples</a:t>
-            </a:r>
-            <a:r>
-              <a:rPr lang="en-GB" sz="2000" dirty="0"/>
-              <a:t> of audio for one channel</a:t>
-            </a:r>
-          </a:p>
-        </p:txBody>
-      </p:sp>
-      <p:sp>
-        <p:nvSpPr>
-          <p:cNvPr id="14" name="Rectangle 13">
-            <a:extLst>
-              <a:ext uri="{FF2B5EF4-FFF2-40B4-BE49-F238E27FC236}">
-                <a16:creationId xmlns:a16="http://schemas.microsoft.com/office/drawing/2014/main" id="{275642E7-463B-B44B-109F-3A652DBE5611}"/>
-              </a:ext>
-            </a:extLst>
-          </p:cNvPr>
-          <p:cNvSpPr/>
-          <p:nvPr/>
-        </p:nvSpPr>
-        <p:spPr>
-          <a:xfrm>
-            <a:off x="348807" y="1993776"/>
-            <a:ext cx="11494385" cy="324063"/>
-          </a:xfrm>
-          <a:prstGeom prst="rect">
-            <a:avLst/>
-          </a:prstGeom>
-          <a:noFill/>
-          <a:ln w="22225"/>
-        </p:spPr>
-        <p:style>
-          <a:lnRef idx="2">
-            <a:schemeClr val="accent1">
-              <a:shade val="15000"/>
-            </a:schemeClr>
-          </a:lnRef>
-          <a:fillRef idx="1">
-            <a:schemeClr val="accent1"/>
-          </a:fillRef>
-          <a:effectRef idx="0">
-            <a:schemeClr val="accent1"/>
-          </a:effectRef>
-          <a:fontRef idx="minor">
-            <a:schemeClr val="lt1"/>
-          </a:fontRef>
-        </p:style>
-        <p:txBody>
-          <a:bodyPr rtlCol="0" anchor="ctr"/>
-          <a:lstStyle/>
-          <a:p>
-            <a:pPr algn="ctr"/>
-            <a:endParaRPr lang="en-GB" sz="1600"/>
-          </a:p>
-        </p:txBody>
-      </p:sp>
-      <p:cxnSp>
-        <p:nvCxnSpPr>
-          <p:cNvPr id="15" name="Straight Arrow Connector 14">
-            <a:extLst>
-              <a:ext uri="{FF2B5EF4-FFF2-40B4-BE49-F238E27FC236}">
-                <a16:creationId xmlns:a16="http://schemas.microsoft.com/office/drawing/2014/main" id="{DDCB9BC9-A092-1713-C6C3-BFD6C15D3AC9}"/>
-              </a:ext>
-            </a:extLst>
-          </p:cNvPr>
-          <p:cNvCxnSpPr>
-            <a:cxnSpLocks/>
-            <a:endCxn id="16" idx="1"/>
-          </p:cNvCxnSpPr>
-          <p:nvPr/>
-        </p:nvCxnSpPr>
-        <p:spPr>
-          <a:xfrm flipV="1">
-            <a:off x="6011559" y="1717336"/>
-            <a:ext cx="2476269" cy="318051"/>
-          </a:xfrm>
-          <a:prstGeom prst="straightConnector1">
-            <a:avLst/>
-          </a:prstGeom>
-          <a:ln w="25400">
-            <a:headEnd type="arrow" w="lg" len="lg"/>
-            <a:tailEnd type="none"/>
-          </a:ln>
-        </p:spPr>
-        <p:style>
-          <a:lnRef idx="1">
-            <a:schemeClr val="accent1"/>
-          </a:lnRef>
-          <a:fillRef idx="0">
-            <a:schemeClr val="accent1"/>
-          </a:fillRef>
-          <a:effectRef idx="0">
-            <a:schemeClr val="accent1"/>
-          </a:effectRef>
-          <a:fontRef idx="minor">
-            <a:schemeClr val="tx1"/>
-          </a:fontRef>
-        </p:style>
-      </p:cxnSp>
-      <p:sp>
-        <p:nvSpPr>
-          <p:cNvPr id="16" name="TextBox 15">
-            <a:extLst>
-              <a:ext uri="{FF2B5EF4-FFF2-40B4-BE49-F238E27FC236}">
-                <a16:creationId xmlns:a16="http://schemas.microsoft.com/office/drawing/2014/main" id="{ADE63019-8049-81C7-102E-EA1188C776DB}"/>
-              </a:ext>
-            </a:extLst>
-          </p:cNvPr>
-          <p:cNvSpPr txBox="1"/>
-          <p:nvPr/>
-        </p:nvSpPr>
-        <p:spPr>
-          <a:xfrm>
-            <a:off x="8487828" y="1363393"/>
-            <a:ext cx="3561172" cy="707886"/>
-          </a:xfrm>
-          <a:prstGeom prst="rect">
-            <a:avLst/>
-          </a:prstGeom>
-          <a:solidFill>
-            <a:schemeClr val="bg1"/>
-          </a:solidFill>
-          <a:ln w="25400">
-            <a:solidFill>
-              <a:schemeClr val="accent1"/>
-            </a:solidFill>
-          </a:ln>
-        </p:spPr>
-        <p:txBody>
-          <a:bodyPr wrap="square" rtlCol="0">
-            <a:spAutoFit/>
-          </a:bodyPr>
-          <a:lstStyle/>
-          <a:p>
-            <a:r>
-              <a:rPr lang="en-GB" sz="2000" dirty="0" err="1"/>
-              <a:t>delayData</a:t>
-            </a:r>
-            <a:r>
-              <a:rPr lang="en-GB" sz="2000" dirty="0"/>
-              <a:t> is circular buffer for finding delay on this channel</a:t>
-            </a:r>
-          </a:p>
-        </p:txBody>
-      </p:sp>
-      <p:sp>
-        <p:nvSpPr>
-          <p:cNvPr id="25" name="Rectangle 24">
-            <a:extLst>
-              <a:ext uri="{FF2B5EF4-FFF2-40B4-BE49-F238E27FC236}">
-                <a16:creationId xmlns:a16="http://schemas.microsoft.com/office/drawing/2014/main" id="{6646C96D-7816-98C5-10F0-3CEB45C5C5A1}"/>
-              </a:ext>
-            </a:extLst>
-          </p:cNvPr>
-          <p:cNvSpPr/>
-          <p:nvPr/>
-        </p:nvSpPr>
-        <p:spPr>
-          <a:xfrm>
-            <a:off x="377159" y="2390011"/>
-            <a:ext cx="3352485" cy="564904"/>
-          </a:xfrm>
-          <a:prstGeom prst="rect">
-            <a:avLst/>
-          </a:prstGeom>
-          <a:noFill/>
-          <a:ln w="22225"/>
-        </p:spPr>
-        <p:style>
-          <a:lnRef idx="2">
-            <a:schemeClr val="accent1">
-              <a:shade val="15000"/>
-            </a:schemeClr>
-          </a:lnRef>
-          <a:fillRef idx="1">
-            <a:schemeClr val="accent1"/>
-          </a:fillRef>
-          <a:effectRef idx="0">
-            <a:schemeClr val="accent1"/>
-          </a:effectRef>
-          <a:fontRef idx="minor">
-            <a:schemeClr val="lt1"/>
-          </a:fontRef>
-        </p:style>
-        <p:txBody>
-          <a:bodyPr rtlCol="0" anchor="ctr"/>
-          <a:lstStyle/>
-          <a:p>
-            <a:pPr algn="ctr"/>
-            <a:endParaRPr lang="en-GB" sz="1600"/>
-          </a:p>
-        </p:txBody>
-      </p:sp>
-      <p:cxnSp>
-        <p:nvCxnSpPr>
-          <p:cNvPr id="26" name="Straight Arrow Connector 25">
-            <a:extLst>
-              <a:ext uri="{FF2B5EF4-FFF2-40B4-BE49-F238E27FC236}">
-                <a16:creationId xmlns:a16="http://schemas.microsoft.com/office/drawing/2014/main" id="{28F28639-EB2B-533B-B309-CD06DD93A12B}"/>
-              </a:ext>
-            </a:extLst>
-          </p:cNvPr>
-          <p:cNvCxnSpPr>
-            <a:cxnSpLocks/>
-            <a:stCxn id="25" idx="3"/>
-            <a:endCxn id="27" idx="1"/>
-          </p:cNvCxnSpPr>
-          <p:nvPr/>
-        </p:nvCxnSpPr>
-        <p:spPr>
-          <a:xfrm>
-            <a:off x="3729644" y="2672463"/>
-            <a:ext cx="1580237" cy="151469"/>
-          </a:xfrm>
-          <a:prstGeom prst="straightConnector1">
-            <a:avLst/>
-          </a:prstGeom>
-          <a:ln w="25400">
-            <a:headEnd type="arrow" w="lg" len="lg"/>
-            <a:tailEnd type="none"/>
-          </a:ln>
-        </p:spPr>
-        <p:style>
-          <a:lnRef idx="1">
-            <a:schemeClr val="accent1"/>
-          </a:lnRef>
-          <a:fillRef idx="0">
-            <a:schemeClr val="accent1"/>
-          </a:fillRef>
-          <a:effectRef idx="0">
-            <a:schemeClr val="accent1"/>
-          </a:effectRef>
-          <a:fontRef idx="minor">
-            <a:schemeClr val="tx1"/>
-          </a:fontRef>
-        </p:style>
-      </p:cxnSp>
-      <p:sp>
-        <p:nvSpPr>
-          <p:cNvPr id="27" name="TextBox 26">
-            <a:extLst>
-              <a:ext uri="{FF2B5EF4-FFF2-40B4-BE49-F238E27FC236}">
-                <a16:creationId xmlns:a16="http://schemas.microsoft.com/office/drawing/2014/main" id="{5E4C18E2-76F0-1118-AF8D-E73F5E0915C3}"/>
-              </a:ext>
-            </a:extLst>
-          </p:cNvPr>
-          <p:cNvSpPr txBox="1"/>
-          <p:nvPr/>
-        </p:nvSpPr>
-        <p:spPr>
-          <a:xfrm>
-            <a:off x="5309881" y="2162212"/>
-            <a:ext cx="3879624" cy="1323439"/>
-          </a:xfrm>
-          <a:prstGeom prst="rect">
-            <a:avLst/>
-          </a:prstGeom>
-          <a:solidFill>
-            <a:schemeClr val="bg1"/>
-          </a:solidFill>
-          <a:ln w="25400">
-            <a:solidFill>
-              <a:schemeClr val="accent1"/>
-            </a:solidFill>
-          </a:ln>
-        </p:spPr>
-        <p:txBody>
-          <a:bodyPr wrap="square" rtlCol="0">
-            <a:spAutoFit/>
-          </a:bodyPr>
-          <a:lstStyle/>
-          <a:p>
-            <a:r>
-              <a:rPr lang="en-GB" sz="2000" dirty="0"/>
-              <a:t>Copy state variables maintained between </a:t>
-            </a:r>
-            <a:r>
-              <a:rPr lang="en-GB" sz="2000" dirty="0" err="1"/>
-              <a:t>processBlock</a:t>
-            </a:r>
-            <a:r>
-              <a:rPr lang="en-GB" sz="2000" dirty="0"/>
-              <a:t> calls. Processing channel can't affect state variable for next one</a:t>
-            </a:r>
-          </a:p>
-        </p:txBody>
-      </p:sp>
-      <p:sp>
-        <p:nvSpPr>
-          <p:cNvPr id="36" name="Rectangle 35">
-            <a:extLst>
-              <a:ext uri="{FF2B5EF4-FFF2-40B4-BE49-F238E27FC236}">
-                <a16:creationId xmlns:a16="http://schemas.microsoft.com/office/drawing/2014/main" id="{FC62B615-4D3F-FB7A-2012-86DE51D18858}"/>
-              </a:ext>
-            </a:extLst>
-          </p:cNvPr>
-          <p:cNvSpPr/>
-          <p:nvPr/>
-        </p:nvSpPr>
-        <p:spPr>
-          <a:xfrm>
-            <a:off x="527900" y="3804273"/>
-            <a:ext cx="6413435" cy="399299"/>
-          </a:xfrm>
-          <a:prstGeom prst="rect">
-            <a:avLst/>
-          </a:prstGeom>
-          <a:noFill/>
-          <a:ln w="22225"/>
-        </p:spPr>
-        <p:style>
-          <a:lnRef idx="2">
-            <a:schemeClr val="accent1">
-              <a:shade val="15000"/>
-            </a:schemeClr>
-          </a:lnRef>
-          <a:fillRef idx="1">
-            <a:schemeClr val="accent1"/>
-          </a:fillRef>
-          <a:effectRef idx="0">
-            <a:schemeClr val="accent1"/>
-          </a:effectRef>
-          <a:fontRef idx="minor">
-            <a:schemeClr val="lt1"/>
-          </a:fontRef>
-        </p:style>
-        <p:txBody>
-          <a:bodyPr rtlCol="0" anchor="ctr"/>
-          <a:lstStyle/>
-          <a:p>
-            <a:pPr algn="ctr"/>
-            <a:endParaRPr lang="en-GB" sz="1600"/>
-          </a:p>
-        </p:txBody>
-      </p:sp>
-      <p:cxnSp>
-        <p:nvCxnSpPr>
-          <p:cNvPr id="37" name="Straight Arrow Connector 36">
-            <a:extLst>
-              <a:ext uri="{FF2B5EF4-FFF2-40B4-BE49-F238E27FC236}">
-                <a16:creationId xmlns:a16="http://schemas.microsoft.com/office/drawing/2014/main" id="{FF72B6BF-BA43-65E0-4E60-FE7A96CEDA93}"/>
-              </a:ext>
-            </a:extLst>
-          </p:cNvPr>
-          <p:cNvCxnSpPr>
-            <a:cxnSpLocks/>
-            <a:stCxn id="36" idx="3"/>
-            <a:endCxn id="38" idx="1"/>
-          </p:cNvCxnSpPr>
-          <p:nvPr/>
-        </p:nvCxnSpPr>
-        <p:spPr>
-          <a:xfrm>
-            <a:off x="6941335" y="4003923"/>
-            <a:ext cx="752603" cy="211490"/>
-          </a:xfrm>
-          <a:prstGeom prst="straightConnector1">
-            <a:avLst/>
-          </a:prstGeom>
-          <a:ln w="25400">
-            <a:headEnd type="arrow" w="lg" len="lg"/>
-            <a:tailEnd type="none"/>
-          </a:ln>
-        </p:spPr>
-        <p:style>
-          <a:lnRef idx="1">
-            <a:schemeClr val="accent1"/>
-          </a:lnRef>
-          <a:fillRef idx="0">
-            <a:schemeClr val="accent1"/>
-          </a:fillRef>
-          <a:effectRef idx="0">
-            <a:schemeClr val="accent1"/>
-          </a:effectRef>
-          <a:fontRef idx="minor">
-            <a:schemeClr val="tx1"/>
-          </a:fontRef>
-        </p:style>
-      </p:cxnSp>
-      <p:sp>
-        <p:nvSpPr>
-          <p:cNvPr id="38" name="TextBox 37">
-            <a:extLst>
-              <a:ext uri="{FF2B5EF4-FFF2-40B4-BE49-F238E27FC236}">
-                <a16:creationId xmlns:a16="http://schemas.microsoft.com/office/drawing/2014/main" id="{234A6778-F1C9-810A-AF27-762F57C32095}"/>
-              </a:ext>
-            </a:extLst>
-          </p:cNvPr>
-          <p:cNvSpPr txBox="1"/>
-          <p:nvPr/>
-        </p:nvSpPr>
-        <p:spPr>
-          <a:xfrm>
-            <a:off x="7693938" y="3553693"/>
-            <a:ext cx="3627998" cy="1323439"/>
-          </a:xfrm>
-          <a:prstGeom prst="rect">
-            <a:avLst/>
-          </a:prstGeom>
-          <a:solidFill>
-            <a:schemeClr val="bg1"/>
-          </a:solidFill>
-          <a:ln w="25400">
-            <a:solidFill>
-              <a:schemeClr val="accent1"/>
-            </a:solidFill>
-          </a:ln>
-        </p:spPr>
-        <p:txBody>
-          <a:bodyPr wrap="square" rtlCol="0">
-            <a:spAutoFit/>
-          </a:bodyPr>
-          <a:lstStyle/>
-          <a:p>
-            <a:r>
-              <a:rPr lang="en-GB" sz="2000" dirty="0"/>
-              <a:t>Store info in delay buffer. </a:t>
-            </a:r>
-            <a:r>
-              <a:rPr lang="en-GB" sz="2000" dirty="0" err="1"/>
-              <a:t>delayData</a:t>
-            </a:r>
-            <a:r>
-              <a:rPr lang="en-GB" sz="2000" dirty="0"/>
-              <a:t>[</a:t>
-            </a:r>
-            <a:r>
-              <a:rPr lang="en-GB" sz="2000" dirty="0" err="1"/>
-              <a:t>dpr</a:t>
-            </a:r>
-            <a:r>
-              <a:rPr lang="en-GB" sz="2000" dirty="0"/>
-              <a:t>] is delay sample we just read. </a:t>
-            </a:r>
-            <a:r>
-              <a:rPr lang="en-GB" sz="2000" dirty="0" err="1"/>
-              <a:t>delayData</a:t>
-            </a:r>
-            <a:r>
-              <a:rPr lang="en-GB" sz="2000" dirty="0"/>
-              <a:t>[</a:t>
-            </a:r>
-            <a:r>
-              <a:rPr lang="en-GB" sz="2000" dirty="0" err="1"/>
-              <a:t>dpw</a:t>
-            </a:r>
-            <a:r>
-              <a:rPr lang="en-GB" sz="2000" dirty="0"/>
-              <a:t>] is what we write to buffer</a:t>
-            </a:r>
-          </a:p>
-        </p:txBody>
-      </p:sp>
-      <p:sp>
-        <p:nvSpPr>
-          <p:cNvPr id="43" name="Rectangle 42">
-            <a:extLst>
-              <a:ext uri="{FF2B5EF4-FFF2-40B4-BE49-F238E27FC236}">
-                <a16:creationId xmlns:a16="http://schemas.microsoft.com/office/drawing/2014/main" id="{BA4EA123-30C3-5A80-66EC-23E79507FC77}"/>
-              </a:ext>
-            </a:extLst>
-          </p:cNvPr>
-          <p:cNvSpPr/>
-          <p:nvPr/>
-        </p:nvSpPr>
-        <p:spPr>
-          <a:xfrm>
-            <a:off x="559851" y="4857795"/>
-            <a:ext cx="3015688" cy="399299"/>
-          </a:xfrm>
-          <a:prstGeom prst="rect">
-            <a:avLst/>
-          </a:prstGeom>
-          <a:noFill/>
-          <a:ln w="22225"/>
-        </p:spPr>
-        <p:style>
-          <a:lnRef idx="2">
-            <a:schemeClr val="accent1">
-              <a:shade val="15000"/>
-            </a:schemeClr>
-          </a:lnRef>
-          <a:fillRef idx="1">
-            <a:schemeClr val="accent1"/>
-          </a:fillRef>
-          <a:effectRef idx="0">
-            <a:schemeClr val="accent1"/>
-          </a:effectRef>
-          <a:fontRef idx="minor">
-            <a:schemeClr val="lt1"/>
-          </a:fontRef>
-        </p:style>
-        <p:txBody>
-          <a:bodyPr rtlCol="0" anchor="ctr"/>
-          <a:lstStyle/>
-          <a:p>
-            <a:pPr algn="ctr"/>
-            <a:endParaRPr lang="en-GB" sz="1600"/>
-          </a:p>
-        </p:txBody>
-      </p:sp>
-      <p:cxnSp>
-        <p:nvCxnSpPr>
-          <p:cNvPr id="44" name="Straight Arrow Connector 43">
-            <a:extLst>
-              <a:ext uri="{FF2B5EF4-FFF2-40B4-BE49-F238E27FC236}">
-                <a16:creationId xmlns:a16="http://schemas.microsoft.com/office/drawing/2014/main" id="{D2D711D5-E360-DA52-420B-70A1D5ADEA2C}"/>
-              </a:ext>
-            </a:extLst>
-          </p:cNvPr>
-          <p:cNvCxnSpPr>
-            <a:cxnSpLocks/>
-            <a:stCxn id="43" idx="3"/>
-            <a:endCxn id="45" idx="1"/>
-          </p:cNvCxnSpPr>
-          <p:nvPr/>
-        </p:nvCxnSpPr>
-        <p:spPr>
-          <a:xfrm>
-            <a:off x="3575539" y="5057445"/>
-            <a:ext cx="3991105" cy="524095"/>
-          </a:xfrm>
-          <a:prstGeom prst="straightConnector1">
-            <a:avLst/>
-          </a:prstGeom>
-          <a:ln w="25400">
-            <a:headEnd type="arrow" w="lg" len="lg"/>
-            <a:tailEnd type="none"/>
-          </a:ln>
-        </p:spPr>
-        <p:style>
-          <a:lnRef idx="1">
-            <a:schemeClr val="accent1"/>
-          </a:lnRef>
-          <a:fillRef idx="0">
-            <a:schemeClr val="accent1"/>
-          </a:fillRef>
-          <a:effectRef idx="0">
-            <a:schemeClr val="accent1"/>
-          </a:effectRef>
-          <a:fontRef idx="minor">
-            <a:schemeClr val="tx1"/>
-          </a:fontRef>
-        </p:style>
-      </p:cxnSp>
-      <p:sp>
-        <p:nvSpPr>
-          <p:cNvPr id="45" name="TextBox 44">
-            <a:extLst>
-              <a:ext uri="{FF2B5EF4-FFF2-40B4-BE49-F238E27FC236}">
-                <a16:creationId xmlns:a16="http://schemas.microsoft.com/office/drawing/2014/main" id="{9B11FA1C-8D32-A487-A444-A9DF52567D68}"/>
-              </a:ext>
-            </a:extLst>
-          </p:cNvPr>
-          <p:cNvSpPr txBox="1"/>
-          <p:nvPr/>
-        </p:nvSpPr>
-        <p:spPr>
-          <a:xfrm>
-            <a:off x="7566644" y="5227597"/>
-            <a:ext cx="2778971" cy="707886"/>
-          </a:xfrm>
-          <a:prstGeom prst="rect">
-            <a:avLst/>
-          </a:prstGeom>
-          <a:solidFill>
-            <a:schemeClr val="bg1"/>
-          </a:solidFill>
-          <a:ln w="25400">
-            <a:solidFill>
-              <a:schemeClr val="accent1"/>
-            </a:solidFill>
-          </a:ln>
-        </p:spPr>
-        <p:txBody>
-          <a:bodyPr wrap="square" rtlCol="0">
-            <a:spAutoFit/>
-          </a:bodyPr>
-          <a:lstStyle/>
-          <a:p>
-            <a:r>
-              <a:rPr lang="en-GB" sz="2000" dirty="0"/>
-              <a:t>Store output sample in buffer, replacing input</a:t>
-            </a:r>
-          </a:p>
-        </p:txBody>
-      </p:sp>
-      <p:sp>
-        <p:nvSpPr>
-          <p:cNvPr id="7" name="Rectangle 6">
-            <a:extLst>
-              <a:ext uri="{FF2B5EF4-FFF2-40B4-BE49-F238E27FC236}">
-                <a16:creationId xmlns:a16="http://schemas.microsoft.com/office/drawing/2014/main" id="{6766F35C-037B-9560-8A77-2E1C3473C46F}"/>
-              </a:ext>
-            </a:extLst>
-          </p:cNvPr>
-          <p:cNvSpPr/>
-          <p:nvPr/>
-        </p:nvSpPr>
-        <p:spPr>
-          <a:xfrm>
-            <a:off x="141423" y="5683901"/>
-            <a:ext cx="3657473" cy="644855"/>
-          </a:xfrm>
-          <a:prstGeom prst="rect">
-            <a:avLst/>
-          </a:prstGeom>
-          <a:noFill/>
-          <a:ln w="22225"/>
-        </p:spPr>
-        <p:style>
-          <a:lnRef idx="2">
-            <a:schemeClr val="accent1">
-              <a:shade val="15000"/>
-            </a:schemeClr>
-          </a:lnRef>
-          <a:fillRef idx="1">
-            <a:schemeClr val="accent1"/>
-          </a:fillRef>
-          <a:effectRef idx="0">
-            <a:schemeClr val="accent1"/>
-          </a:effectRef>
-          <a:fontRef idx="minor">
-            <a:schemeClr val="lt1"/>
-          </a:fontRef>
-        </p:style>
-        <p:txBody>
-          <a:bodyPr rtlCol="0" anchor="ctr"/>
-          <a:lstStyle/>
-          <a:p>
-            <a:pPr algn="ctr"/>
-            <a:endParaRPr lang="en-GB" sz="1600"/>
-          </a:p>
-        </p:txBody>
-      </p:sp>
-      <p:cxnSp>
-        <p:nvCxnSpPr>
-          <p:cNvPr id="8" name="Straight Arrow Connector 7">
-            <a:extLst>
-              <a:ext uri="{FF2B5EF4-FFF2-40B4-BE49-F238E27FC236}">
-                <a16:creationId xmlns:a16="http://schemas.microsoft.com/office/drawing/2014/main" id="{EF1F114E-0376-69B7-EEEE-F4B29D60C3C9}"/>
-              </a:ext>
-            </a:extLst>
-          </p:cNvPr>
-          <p:cNvCxnSpPr>
-            <a:cxnSpLocks/>
-            <a:stCxn id="7" idx="3"/>
-            <a:endCxn id="9" idx="1"/>
-          </p:cNvCxnSpPr>
-          <p:nvPr/>
-        </p:nvCxnSpPr>
-        <p:spPr>
-          <a:xfrm>
-            <a:off x="3798896" y="6006329"/>
-            <a:ext cx="1824128" cy="28486"/>
-          </a:xfrm>
-          <a:prstGeom prst="straightConnector1">
-            <a:avLst/>
-          </a:prstGeom>
-          <a:ln w="25400">
-            <a:headEnd type="arrow" w="lg" len="lg"/>
-            <a:tailEnd type="none"/>
-          </a:ln>
-        </p:spPr>
-        <p:style>
-          <a:lnRef idx="1">
-            <a:schemeClr val="accent1"/>
-          </a:lnRef>
-          <a:fillRef idx="0">
-            <a:schemeClr val="accent1"/>
-          </a:fillRef>
-          <a:effectRef idx="0">
-            <a:schemeClr val="accent1"/>
-          </a:effectRef>
-          <a:fontRef idx="minor">
-            <a:schemeClr val="tx1"/>
-          </a:fontRef>
-        </p:style>
-      </p:cxnSp>
-      <p:sp>
-        <p:nvSpPr>
-          <p:cNvPr id="9" name="TextBox 8">
-            <a:extLst>
-              <a:ext uri="{FF2B5EF4-FFF2-40B4-BE49-F238E27FC236}">
-                <a16:creationId xmlns:a16="http://schemas.microsoft.com/office/drawing/2014/main" id="{B252E439-9FEB-EAC0-5B3D-22240C891CE3}"/>
-              </a:ext>
-            </a:extLst>
-          </p:cNvPr>
-          <p:cNvSpPr txBox="1"/>
-          <p:nvPr/>
-        </p:nvSpPr>
-        <p:spPr>
-          <a:xfrm>
-            <a:off x="5623024" y="5680871"/>
-            <a:ext cx="2879683" cy="707887"/>
-          </a:xfrm>
-          <a:prstGeom prst="rect">
-            <a:avLst/>
-          </a:prstGeom>
-          <a:solidFill>
-            <a:schemeClr val="bg1"/>
-          </a:solidFill>
-          <a:ln w="25400">
-            <a:solidFill>
-              <a:schemeClr val="accent1"/>
-            </a:solidFill>
-          </a:ln>
-        </p:spPr>
-        <p:txBody>
-          <a:bodyPr wrap="square" rtlCol="0">
-            <a:spAutoFit/>
-          </a:bodyPr>
-          <a:lstStyle/>
-          <a:p>
-            <a:pPr>
-              <a:lnSpc>
-                <a:spcPct val="100000"/>
-              </a:lnSpc>
-            </a:pPr>
-            <a:r>
-              <a:rPr lang="en-GB" sz="2000" dirty="0">
-                <a:solidFill>
-                  <a:prstClr val="black"/>
-                </a:solidFill>
-              </a:rPr>
-              <a:t>transfer local copies back to main state variable</a:t>
-            </a:r>
-          </a:p>
-        </p:txBody>
-      </p:sp>
-    </p:spTree>
-    <p:extLst>
-      <p:ext uri="{BB962C8B-B14F-4D97-AF65-F5344CB8AC3E}">
-        <p14:creationId xmlns:p14="http://schemas.microsoft.com/office/powerpoint/2010/main" val="2193388634"/>
-      </p:ext>
-    </p:extLst>
-  </p:cSld>
-  <p:clrMapOvr>
-    <a:masterClrMapping/>
-  </p:clrMapOvr>
-  <p:timing>
-    <p:tnLst>
-      <p:par>
-        <p:cTn id="1" dur="indefinite" restart="never" nodeType="tmRoot">
-          <p:childTnLst>
-            <p:seq concurrent="1" nextAc="seek">
-              <p:cTn id="2" dur="indefinite" nodeType="mainSeq">
-                <p:childTnLst>
-                  <p:par>
-                    <p:cTn id="3" fill="hold">
-                      <p:stCondLst>
-                        <p:cond delay="indefinite"/>
-                      </p:stCondLst>
-                      <p:childTnLst>
-                        <p:par>
-                          <p:cTn id="4" fill="hold">
-                            <p:stCondLst>
-                              <p:cond delay="0"/>
-                            </p:stCondLst>
-                            <p:childTnLst>
-                              <p:par>
-                                <p:cTn id="5" presetID="1" presetClass="entr" presetSubtype="0" fill="hold" nodeType="clickEffect">
-                                  <p:stCondLst>
-                                    <p:cond delay="0"/>
-                                  </p:stCondLst>
-                                  <p:childTnLst>
-                                    <p:set>
-                                      <p:cBhvr>
-                                        <p:cTn id="6" dur="1" fill="hold">
-                                          <p:stCondLst>
-                                            <p:cond delay="0"/>
-                                          </p:stCondLst>
-                                        </p:cTn>
-                                        <p:tgtEl>
-                                          <p:spTgt spid="5"/>
-                                        </p:tgtEl>
-                                        <p:attrNameLst>
-                                          <p:attrName>style.visibility</p:attrName>
-                                        </p:attrNameLst>
-                                      </p:cBhvr>
-                                      <p:to>
-                                        <p:strVal val="visible"/>
-                                      </p:to>
-                                    </p:set>
-                                  </p:childTnLst>
-                                </p:cTn>
-                              </p:par>
-                              <p:par>
-                                <p:cTn id="7" presetID="1" presetClass="entr" presetSubtype="0" fill="hold" grpId="0" nodeType="withEffect">
-                                  <p:stCondLst>
-                                    <p:cond delay="0"/>
-                                  </p:stCondLst>
-                                  <p:childTnLst>
-                                    <p:set>
-                                      <p:cBhvr>
-                                        <p:cTn id="8" dur="1" fill="hold">
-                                          <p:stCondLst>
-                                            <p:cond delay="0"/>
-                                          </p:stCondLst>
-                                        </p:cTn>
-                                        <p:tgtEl>
-                                          <p:spTgt spid="6"/>
-                                        </p:tgtEl>
-                                        <p:attrNameLst>
-                                          <p:attrName>style.visibility</p:attrName>
-                                        </p:attrNameLst>
-                                      </p:cBhvr>
-                                      <p:to>
-                                        <p:strVal val="visible"/>
-                                      </p:to>
-                                    </p:set>
-                                  </p:childTnLst>
-                                </p:cTn>
-                              </p:par>
-                              <p:par>
-                                <p:cTn id="9" presetID="1" presetClass="entr" presetSubtype="0" fill="hold" grpId="0" nodeType="withEffect">
-                                  <p:stCondLst>
-                                    <p:cond delay="0"/>
-                                  </p:stCondLst>
-                                  <p:childTnLst>
-                                    <p:set>
-                                      <p:cBhvr>
-                                        <p:cTn id="10" dur="1" fill="hold">
-                                          <p:stCondLst>
-                                            <p:cond delay="0"/>
-                                          </p:stCondLst>
-                                        </p:cTn>
-                                        <p:tgtEl>
-                                          <p:spTgt spid="4"/>
-                                        </p:tgtEl>
-                                        <p:attrNameLst>
-                                          <p:attrName>style.visibility</p:attrName>
-                                        </p:attrNameLst>
-                                      </p:cBhvr>
-                                      <p:to>
-                                        <p:strVal val="visible"/>
-                                      </p:to>
-                                    </p:set>
-                                  </p:childTnLst>
-                                </p:cTn>
-                              </p:par>
-                            </p:childTnLst>
-                          </p:cTn>
-                        </p:par>
-                      </p:childTnLst>
-                    </p:cTn>
-                  </p:par>
-                  <p:par>
-                    <p:cTn id="11" fill="hold">
-                      <p:stCondLst>
-                        <p:cond delay="indefinite"/>
-                      </p:stCondLst>
-                      <p:childTnLst>
-                        <p:par>
-                          <p:cTn id="12" fill="hold">
-                            <p:stCondLst>
-                              <p:cond delay="0"/>
-                            </p:stCondLst>
-                            <p:childTnLst>
-                              <p:par>
-                                <p:cTn id="13" presetID="2" presetClass="exit" presetSubtype="4" fill="hold" nodeType="clickEffect">
-                                  <p:stCondLst>
-                                    <p:cond delay="0"/>
-                                  </p:stCondLst>
-                                  <p:childTnLst>
-                                    <p:anim calcmode="lin" valueType="num">
-                                      <p:cBhvr additive="base">
-                                        <p:cTn id="14" dur="500"/>
-                                        <p:tgtEl>
-                                          <p:spTgt spid="5"/>
-                                        </p:tgtEl>
-                                        <p:attrNameLst>
-                                          <p:attrName>ppt_x</p:attrName>
-                                        </p:attrNameLst>
-                                      </p:cBhvr>
-                                      <p:tavLst>
-                                        <p:tav tm="0">
-                                          <p:val>
-                                            <p:strVal val="ppt_x"/>
-                                          </p:val>
-                                        </p:tav>
-                                        <p:tav tm="100000">
-                                          <p:val>
-                                            <p:strVal val="ppt_x"/>
-                                          </p:val>
-                                        </p:tav>
-                                      </p:tavLst>
-                                    </p:anim>
-                                    <p:anim calcmode="lin" valueType="num">
-                                      <p:cBhvr additive="base">
-                                        <p:cTn id="15" dur="500"/>
-                                        <p:tgtEl>
-                                          <p:spTgt spid="5"/>
-                                        </p:tgtEl>
-                                        <p:attrNameLst>
-                                          <p:attrName>ppt_y</p:attrName>
-                                        </p:attrNameLst>
-                                      </p:cBhvr>
-                                      <p:tavLst>
-                                        <p:tav tm="0">
-                                          <p:val>
-                                            <p:strVal val="ppt_y"/>
-                                          </p:val>
-                                        </p:tav>
-                                        <p:tav tm="100000">
-                                          <p:val>
-                                            <p:strVal val="1+ppt_h/2"/>
-                                          </p:val>
-                                        </p:tav>
-                                      </p:tavLst>
-                                    </p:anim>
-                                    <p:set>
-                                      <p:cBhvr>
-                                        <p:cTn id="16" dur="1" fill="hold">
-                                          <p:stCondLst>
-                                            <p:cond delay="499"/>
-                                          </p:stCondLst>
-                                        </p:cTn>
-                                        <p:tgtEl>
-                                          <p:spTgt spid="5"/>
-                                        </p:tgtEl>
-                                        <p:attrNameLst>
-                                          <p:attrName>style.visibility</p:attrName>
-                                        </p:attrNameLst>
-                                      </p:cBhvr>
-                                      <p:to>
-                                        <p:strVal val="hidden"/>
-                                      </p:to>
-                                    </p:set>
-                                  </p:childTnLst>
-                                </p:cTn>
-                              </p:par>
-                              <p:par>
-                                <p:cTn id="17" presetID="2" presetClass="exit" presetSubtype="4" fill="hold" grpId="1" nodeType="withEffect">
-                                  <p:stCondLst>
-                                    <p:cond delay="0"/>
-                                  </p:stCondLst>
-                                  <p:childTnLst>
-                                    <p:anim calcmode="lin" valueType="num">
-                                      <p:cBhvr additive="base">
-                                        <p:cTn id="18" dur="500"/>
-                                        <p:tgtEl>
-                                          <p:spTgt spid="6"/>
-                                        </p:tgtEl>
-                                        <p:attrNameLst>
-                                          <p:attrName>ppt_x</p:attrName>
-                                        </p:attrNameLst>
-                                      </p:cBhvr>
-                                      <p:tavLst>
-                                        <p:tav tm="0">
-                                          <p:val>
-                                            <p:strVal val="ppt_x"/>
-                                          </p:val>
-                                        </p:tav>
-                                        <p:tav tm="100000">
-                                          <p:val>
-                                            <p:strVal val="ppt_x"/>
-                                          </p:val>
-                                        </p:tav>
-                                      </p:tavLst>
-                                    </p:anim>
-                                    <p:anim calcmode="lin" valueType="num">
-                                      <p:cBhvr additive="base">
-                                        <p:cTn id="19" dur="500"/>
-                                        <p:tgtEl>
-                                          <p:spTgt spid="6"/>
-                                        </p:tgtEl>
-                                        <p:attrNameLst>
-                                          <p:attrName>ppt_y</p:attrName>
-                                        </p:attrNameLst>
-                                      </p:cBhvr>
-                                      <p:tavLst>
-                                        <p:tav tm="0">
-                                          <p:val>
-                                            <p:strVal val="ppt_y"/>
-                                          </p:val>
-                                        </p:tav>
-                                        <p:tav tm="100000">
-                                          <p:val>
-                                            <p:strVal val="1+ppt_h/2"/>
-                                          </p:val>
-                                        </p:tav>
-                                      </p:tavLst>
-                                    </p:anim>
-                                    <p:set>
-                                      <p:cBhvr>
-                                        <p:cTn id="20" dur="1" fill="hold">
-                                          <p:stCondLst>
-                                            <p:cond delay="499"/>
-                                          </p:stCondLst>
-                                        </p:cTn>
-                                        <p:tgtEl>
-                                          <p:spTgt spid="6"/>
-                                        </p:tgtEl>
-                                        <p:attrNameLst>
-                                          <p:attrName>style.visibility</p:attrName>
-                                        </p:attrNameLst>
-                                      </p:cBhvr>
-                                      <p:to>
-                                        <p:strVal val="hidden"/>
-                                      </p:to>
-                                    </p:set>
-                                  </p:childTnLst>
-                                </p:cTn>
-                              </p:par>
-                              <p:par>
-                                <p:cTn id="21" presetID="2" presetClass="exit" presetSubtype="4" fill="hold" grpId="1" nodeType="withEffect">
-                                  <p:stCondLst>
-                                    <p:cond delay="0"/>
-                                  </p:stCondLst>
-                                  <p:childTnLst>
-                                    <p:anim calcmode="lin" valueType="num">
-                                      <p:cBhvr additive="base">
-                                        <p:cTn id="22" dur="500"/>
-                                        <p:tgtEl>
-                                          <p:spTgt spid="4"/>
-                                        </p:tgtEl>
-                                        <p:attrNameLst>
-                                          <p:attrName>ppt_x</p:attrName>
-                                        </p:attrNameLst>
-                                      </p:cBhvr>
-                                      <p:tavLst>
-                                        <p:tav tm="0">
-                                          <p:val>
-                                            <p:strVal val="ppt_x"/>
-                                          </p:val>
-                                        </p:tav>
-                                        <p:tav tm="100000">
-                                          <p:val>
-                                            <p:strVal val="ppt_x"/>
-                                          </p:val>
-                                        </p:tav>
-                                      </p:tavLst>
-                                    </p:anim>
-                                    <p:anim calcmode="lin" valueType="num">
-                                      <p:cBhvr additive="base">
-                                        <p:cTn id="23" dur="500"/>
-                                        <p:tgtEl>
-                                          <p:spTgt spid="4"/>
-                                        </p:tgtEl>
-                                        <p:attrNameLst>
-                                          <p:attrName>ppt_y</p:attrName>
-                                        </p:attrNameLst>
-                                      </p:cBhvr>
-                                      <p:tavLst>
-                                        <p:tav tm="0">
-                                          <p:val>
-                                            <p:strVal val="ppt_y"/>
-                                          </p:val>
-                                        </p:tav>
-                                        <p:tav tm="100000">
-                                          <p:val>
-                                            <p:strVal val="1+ppt_h/2"/>
-                                          </p:val>
-                                        </p:tav>
-                                      </p:tavLst>
-                                    </p:anim>
-                                    <p:set>
-                                      <p:cBhvr>
-                                        <p:cTn id="24" dur="1" fill="hold">
-                                          <p:stCondLst>
-                                            <p:cond delay="499"/>
-                                          </p:stCondLst>
-                                        </p:cTn>
-                                        <p:tgtEl>
-                                          <p:spTgt spid="4"/>
-                                        </p:tgtEl>
-                                        <p:attrNameLst>
-                                          <p:attrName>style.visibility</p:attrName>
-                                        </p:attrNameLst>
-                                      </p:cBhvr>
-                                      <p:to>
-                                        <p:strVal val="hidden"/>
-                                      </p:to>
-                                    </p:set>
-                                  </p:childTnLst>
-                                </p:cTn>
-                              </p:par>
-                            </p:childTnLst>
-                          </p:cTn>
-                        </p:par>
-                      </p:childTnLst>
-                    </p:cTn>
-                  </p:par>
-                  <p:par>
-                    <p:cTn id="25" fill="hold">
-                      <p:stCondLst>
-                        <p:cond delay="indefinite"/>
-                      </p:stCondLst>
-                      <p:childTnLst>
-                        <p:par>
-                          <p:cTn id="26" fill="hold">
-                            <p:stCondLst>
-                              <p:cond delay="0"/>
-                            </p:stCondLst>
-                            <p:childTnLst>
-                              <p:par>
-                                <p:cTn id="27" presetID="1" presetClass="entr" presetSubtype="0" fill="hold" nodeType="clickEffect">
-                                  <p:stCondLst>
-                                    <p:cond delay="0"/>
-                                  </p:stCondLst>
-                                  <p:childTnLst>
-                                    <p:set>
-                                      <p:cBhvr>
-                                        <p:cTn id="28" dur="1" fill="hold">
-                                          <p:stCondLst>
-                                            <p:cond delay="0"/>
-                                          </p:stCondLst>
-                                        </p:cTn>
-                                        <p:tgtEl>
-                                          <p:spTgt spid="15"/>
-                                        </p:tgtEl>
-                                        <p:attrNameLst>
-                                          <p:attrName>style.visibility</p:attrName>
-                                        </p:attrNameLst>
-                                      </p:cBhvr>
-                                      <p:to>
-                                        <p:strVal val="visible"/>
-                                      </p:to>
-                                    </p:set>
-                                  </p:childTnLst>
-                                </p:cTn>
-                              </p:par>
-                              <p:par>
-                                <p:cTn id="29" presetID="1" presetClass="entr" presetSubtype="0" fill="hold" grpId="0" nodeType="withEffect">
-                                  <p:stCondLst>
-                                    <p:cond delay="0"/>
-                                  </p:stCondLst>
-                                  <p:childTnLst>
-                                    <p:set>
-                                      <p:cBhvr>
-                                        <p:cTn id="30" dur="1" fill="hold">
-                                          <p:stCondLst>
-                                            <p:cond delay="0"/>
-                                          </p:stCondLst>
-                                        </p:cTn>
-                                        <p:tgtEl>
-                                          <p:spTgt spid="16"/>
-                                        </p:tgtEl>
-                                        <p:attrNameLst>
-                                          <p:attrName>style.visibility</p:attrName>
-                                        </p:attrNameLst>
-                                      </p:cBhvr>
-                                      <p:to>
-                                        <p:strVal val="visible"/>
-                                      </p:to>
-                                    </p:set>
-                                  </p:childTnLst>
-                                </p:cTn>
-                              </p:par>
-                              <p:par>
-                                <p:cTn id="31" presetID="1" presetClass="entr" presetSubtype="0" fill="hold" grpId="0" nodeType="withEffect">
-                                  <p:stCondLst>
-                                    <p:cond delay="0"/>
-                                  </p:stCondLst>
-                                  <p:childTnLst>
-                                    <p:set>
-                                      <p:cBhvr>
-                                        <p:cTn id="32" dur="1" fill="hold">
-                                          <p:stCondLst>
-                                            <p:cond delay="0"/>
-                                          </p:stCondLst>
-                                        </p:cTn>
-                                        <p:tgtEl>
-                                          <p:spTgt spid="14"/>
-                                        </p:tgtEl>
-                                        <p:attrNameLst>
-                                          <p:attrName>style.visibility</p:attrName>
-                                        </p:attrNameLst>
-                                      </p:cBhvr>
-                                      <p:to>
-                                        <p:strVal val="visible"/>
-                                      </p:to>
-                                    </p:set>
-                                  </p:childTnLst>
-                                </p:cTn>
-                              </p:par>
-                            </p:childTnLst>
-                          </p:cTn>
-                        </p:par>
-                      </p:childTnLst>
-                    </p:cTn>
-                  </p:par>
-                  <p:par>
-                    <p:cTn id="33" fill="hold">
-                      <p:stCondLst>
-                        <p:cond delay="indefinite"/>
-                      </p:stCondLst>
-                      <p:childTnLst>
-                        <p:par>
-                          <p:cTn id="34" fill="hold">
-                            <p:stCondLst>
-                              <p:cond delay="0"/>
-                            </p:stCondLst>
-                            <p:childTnLst>
-                              <p:par>
-                                <p:cTn id="35" presetID="2" presetClass="exit" presetSubtype="4" fill="hold" nodeType="clickEffect">
-                                  <p:stCondLst>
-                                    <p:cond delay="0"/>
-                                  </p:stCondLst>
-                                  <p:childTnLst>
-                                    <p:anim calcmode="lin" valueType="num">
-                                      <p:cBhvr additive="base">
-                                        <p:cTn id="36" dur="500"/>
-                                        <p:tgtEl>
-                                          <p:spTgt spid="15"/>
-                                        </p:tgtEl>
-                                        <p:attrNameLst>
-                                          <p:attrName>ppt_x</p:attrName>
-                                        </p:attrNameLst>
-                                      </p:cBhvr>
-                                      <p:tavLst>
-                                        <p:tav tm="0">
-                                          <p:val>
-                                            <p:strVal val="ppt_x"/>
-                                          </p:val>
-                                        </p:tav>
-                                        <p:tav tm="100000">
-                                          <p:val>
-                                            <p:strVal val="ppt_x"/>
-                                          </p:val>
-                                        </p:tav>
-                                      </p:tavLst>
-                                    </p:anim>
-                                    <p:anim calcmode="lin" valueType="num">
-                                      <p:cBhvr additive="base">
-                                        <p:cTn id="37" dur="500"/>
-                                        <p:tgtEl>
-                                          <p:spTgt spid="15"/>
-                                        </p:tgtEl>
-                                        <p:attrNameLst>
-                                          <p:attrName>ppt_y</p:attrName>
-                                        </p:attrNameLst>
-                                      </p:cBhvr>
-                                      <p:tavLst>
-                                        <p:tav tm="0">
-                                          <p:val>
-                                            <p:strVal val="ppt_y"/>
-                                          </p:val>
-                                        </p:tav>
-                                        <p:tav tm="100000">
-                                          <p:val>
-                                            <p:strVal val="1+ppt_h/2"/>
-                                          </p:val>
-                                        </p:tav>
-                                      </p:tavLst>
-                                    </p:anim>
-                                    <p:set>
-                                      <p:cBhvr>
-                                        <p:cTn id="38" dur="1" fill="hold">
-                                          <p:stCondLst>
-                                            <p:cond delay="499"/>
-                                          </p:stCondLst>
-                                        </p:cTn>
-                                        <p:tgtEl>
-                                          <p:spTgt spid="15"/>
-                                        </p:tgtEl>
-                                        <p:attrNameLst>
-                                          <p:attrName>style.visibility</p:attrName>
-                                        </p:attrNameLst>
-                                      </p:cBhvr>
-                                      <p:to>
-                                        <p:strVal val="hidden"/>
-                                      </p:to>
-                                    </p:set>
-                                  </p:childTnLst>
-                                </p:cTn>
-                              </p:par>
-                              <p:par>
-                                <p:cTn id="39" presetID="2" presetClass="exit" presetSubtype="4" fill="hold" grpId="1" nodeType="withEffect">
-                                  <p:stCondLst>
-                                    <p:cond delay="0"/>
-                                  </p:stCondLst>
-                                  <p:childTnLst>
-                                    <p:anim calcmode="lin" valueType="num">
-                                      <p:cBhvr additive="base">
-                                        <p:cTn id="40" dur="500"/>
-                                        <p:tgtEl>
-                                          <p:spTgt spid="16"/>
-                                        </p:tgtEl>
-                                        <p:attrNameLst>
-                                          <p:attrName>ppt_x</p:attrName>
-                                        </p:attrNameLst>
-                                      </p:cBhvr>
-                                      <p:tavLst>
-                                        <p:tav tm="0">
-                                          <p:val>
-                                            <p:strVal val="ppt_x"/>
-                                          </p:val>
-                                        </p:tav>
-                                        <p:tav tm="100000">
-                                          <p:val>
-                                            <p:strVal val="ppt_x"/>
-                                          </p:val>
-                                        </p:tav>
-                                      </p:tavLst>
-                                    </p:anim>
-                                    <p:anim calcmode="lin" valueType="num">
-                                      <p:cBhvr additive="base">
-                                        <p:cTn id="41" dur="500"/>
-                                        <p:tgtEl>
-                                          <p:spTgt spid="16"/>
-                                        </p:tgtEl>
-                                        <p:attrNameLst>
-                                          <p:attrName>ppt_y</p:attrName>
-                                        </p:attrNameLst>
-                                      </p:cBhvr>
-                                      <p:tavLst>
-                                        <p:tav tm="0">
-                                          <p:val>
-                                            <p:strVal val="ppt_y"/>
-                                          </p:val>
-                                        </p:tav>
-                                        <p:tav tm="100000">
-                                          <p:val>
-                                            <p:strVal val="1+ppt_h/2"/>
-                                          </p:val>
-                                        </p:tav>
-                                      </p:tavLst>
-                                    </p:anim>
-                                    <p:set>
-                                      <p:cBhvr>
-                                        <p:cTn id="42" dur="1" fill="hold">
-                                          <p:stCondLst>
-                                            <p:cond delay="499"/>
-                                          </p:stCondLst>
-                                        </p:cTn>
-                                        <p:tgtEl>
-                                          <p:spTgt spid="16"/>
-                                        </p:tgtEl>
-                                        <p:attrNameLst>
-                                          <p:attrName>style.visibility</p:attrName>
-                                        </p:attrNameLst>
-                                      </p:cBhvr>
-                                      <p:to>
-                                        <p:strVal val="hidden"/>
-                                      </p:to>
-                                    </p:set>
-                                  </p:childTnLst>
-                                </p:cTn>
-                              </p:par>
-                              <p:par>
-                                <p:cTn id="43" presetID="2" presetClass="exit" presetSubtype="4" fill="hold" grpId="1" nodeType="withEffect">
-                                  <p:stCondLst>
-                                    <p:cond delay="0"/>
-                                  </p:stCondLst>
-                                  <p:childTnLst>
-                                    <p:anim calcmode="lin" valueType="num">
-                                      <p:cBhvr additive="base">
-                                        <p:cTn id="44" dur="500"/>
-                                        <p:tgtEl>
-                                          <p:spTgt spid="14"/>
-                                        </p:tgtEl>
-                                        <p:attrNameLst>
-                                          <p:attrName>ppt_x</p:attrName>
-                                        </p:attrNameLst>
-                                      </p:cBhvr>
-                                      <p:tavLst>
-                                        <p:tav tm="0">
-                                          <p:val>
-                                            <p:strVal val="ppt_x"/>
-                                          </p:val>
-                                        </p:tav>
-                                        <p:tav tm="100000">
-                                          <p:val>
-                                            <p:strVal val="ppt_x"/>
-                                          </p:val>
-                                        </p:tav>
-                                      </p:tavLst>
-                                    </p:anim>
-                                    <p:anim calcmode="lin" valueType="num">
-                                      <p:cBhvr additive="base">
-                                        <p:cTn id="45" dur="500"/>
-                                        <p:tgtEl>
-                                          <p:spTgt spid="14"/>
-                                        </p:tgtEl>
-                                        <p:attrNameLst>
-                                          <p:attrName>ppt_y</p:attrName>
-                                        </p:attrNameLst>
-                                      </p:cBhvr>
-                                      <p:tavLst>
-                                        <p:tav tm="0">
-                                          <p:val>
-                                            <p:strVal val="ppt_y"/>
-                                          </p:val>
-                                        </p:tav>
-                                        <p:tav tm="100000">
-                                          <p:val>
-                                            <p:strVal val="1+ppt_h/2"/>
-                                          </p:val>
-                                        </p:tav>
-                                      </p:tavLst>
-                                    </p:anim>
-                                    <p:set>
-                                      <p:cBhvr>
-                                        <p:cTn id="46" dur="1" fill="hold">
-                                          <p:stCondLst>
-                                            <p:cond delay="499"/>
-                                          </p:stCondLst>
-                                        </p:cTn>
-                                        <p:tgtEl>
-                                          <p:spTgt spid="14"/>
-                                        </p:tgtEl>
-                                        <p:attrNameLst>
-                                          <p:attrName>style.visibility</p:attrName>
-                                        </p:attrNameLst>
-                                      </p:cBhvr>
-                                      <p:to>
-                                        <p:strVal val="hidden"/>
-                                      </p:to>
-                                    </p:set>
-                                  </p:childTnLst>
-                                </p:cTn>
-                              </p:par>
-                            </p:childTnLst>
-                          </p:cTn>
-                        </p:par>
-                      </p:childTnLst>
-                    </p:cTn>
-                  </p:par>
-                  <p:par>
-                    <p:cTn id="47" fill="hold">
-                      <p:stCondLst>
-                        <p:cond delay="indefinite"/>
-                      </p:stCondLst>
-                      <p:childTnLst>
-                        <p:par>
-                          <p:cTn id="48" fill="hold">
-                            <p:stCondLst>
-                              <p:cond delay="0"/>
-                            </p:stCondLst>
-                            <p:childTnLst>
-                              <p:par>
-                                <p:cTn id="49" presetID="1" presetClass="entr" presetSubtype="0" fill="hold" nodeType="clickEffect">
-                                  <p:stCondLst>
-                                    <p:cond delay="0"/>
-                                  </p:stCondLst>
-                                  <p:childTnLst>
-                                    <p:set>
-                                      <p:cBhvr>
-                                        <p:cTn id="50" dur="1" fill="hold">
-                                          <p:stCondLst>
-                                            <p:cond delay="0"/>
-                                          </p:stCondLst>
-                                        </p:cTn>
-                                        <p:tgtEl>
-                                          <p:spTgt spid="26"/>
-                                        </p:tgtEl>
-                                        <p:attrNameLst>
-                                          <p:attrName>style.visibility</p:attrName>
-                                        </p:attrNameLst>
-                                      </p:cBhvr>
-                                      <p:to>
-                                        <p:strVal val="visible"/>
-                                      </p:to>
-                                    </p:set>
-                                  </p:childTnLst>
-                                </p:cTn>
-                              </p:par>
-                              <p:par>
-                                <p:cTn id="51" presetID="1" presetClass="entr" presetSubtype="0" fill="hold" grpId="0" nodeType="withEffect">
-                                  <p:stCondLst>
-                                    <p:cond delay="0"/>
-                                  </p:stCondLst>
-                                  <p:childTnLst>
-                                    <p:set>
-                                      <p:cBhvr>
-                                        <p:cTn id="52" dur="1" fill="hold">
-                                          <p:stCondLst>
-                                            <p:cond delay="0"/>
-                                          </p:stCondLst>
-                                        </p:cTn>
-                                        <p:tgtEl>
-                                          <p:spTgt spid="27"/>
-                                        </p:tgtEl>
-                                        <p:attrNameLst>
-                                          <p:attrName>style.visibility</p:attrName>
-                                        </p:attrNameLst>
-                                      </p:cBhvr>
-                                      <p:to>
-                                        <p:strVal val="visible"/>
-                                      </p:to>
-                                    </p:set>
-                                  </p:childTnLst>
-                                </p:cTn>
-                              </p:par>
-                              <p:par>
-                                <p:cTn id="53" presetID="1" presetClass="entr" presetSubtype="0" fill="hold" grpId="0" nodeType="withEffect">
-                                  <p:stCondLst>
-                                    <p:cond delay="0"/>
-                                  </p:stCondLst>
-                                  <p:childTnLst>
-                                    <p:set>
-                                      <p:cBhvr>
-                                        <p:cTn id="54" dur="1" fill="hold">
-                                          <p:stCondLst>
-                                            <p:cond delay="0"/>
-                                          </p:stCondLst>
-                                        </p:cTn>
-                                        <p:tgtEl>
-                                          <p:spTgt spid="25"/>
-                                        </p:tgtEl>
-                                        <p:attrNameLst>
-                                          <p:attrName>style.visibility</p:attrName>
-                                        </p:attrNameLst>
-                                      </p:cBhvr>
-                                      <p:to>
-                                        <p:strVal val="visible"/>
-                                      </p:to>
-                                    </p:set>
-                                  </p:childTnLst>
-                                </p:cTn>
-                              </p:par>
-                            </p:childTnLst>
-                          </p:cTn>
-                        </p:par>
-                      </p:childTnLst>
-                    </p:cTn>
-                  </p:par>
-                  <p:par>
-                    <p:cTn id="55" fill="hold">
-                      <p:stCondLst>
-                        <p:cond delay="indefinite"/>
-                      </p:stCondLst>
-                      <p:childTnLst>
-                        <p:par>
-                          <p:cTn id="56" fill="hold">
-                            <p:stCondLst>
-                              <p:cond delay="0"/>
-                            </p:stCondLst>
-                            <p:childTnLst>
-                              <p:par>
-                                <p:cTn id="57" presetID="2" presetClass="exit" presetSubtype="4" fill="hold" nodeType="clickEffect">
-                                  <p:stCondLst>
-                                    <p:cond delay="0"/>
-                                  </p:stCondLst>
-                                  <p:childTnLst>
-                                    <p:anim calcmode="lin" valueType="num">
-                                      <p:cBhvr additive="base">
-                                        <p:cTn id="58" dur="500"/>
-                                        <p:tgtEl>
-                                          <p:spTgt spid="26"/>
-                                        </p:tgtEl>
-                                        <p:attrNameLst>
-                                          <p:attrName>ppt_x</p:attrName>
-                                        </p:attrNameLst>
-                                      </p:cBhvr>
-                                      <p:tavLst>
-                                        <p:tav tm="0">
-                                          <p:val>
-                                            <p:strVal val="ppt_x"/>
-                                          </p:val>
-                                        </p:tav>
-                                        <p:tav tm="100000">
-                                          <p:val>
-                                            <p:strVal val="ppt_x"/>
-                                          </p:val>
-                                        </p:tav>
-                                      </p:tavLst>
-                                    </p:anim>
-                                    <p:anim calcmode="lin" valueType="num">
-                                      <p:cBhvr additive="base">
-                                        <p:cTn id="59" dur="500"/>
-                                        <p:tgtEl>
-                                          <p:spTgt spid="26"/>
-                                        </p:tgtEl>
-                                        <p:attrNameLst>
-                                          <p:attrName>ppt_y</p:attrName>
-                                        </p:attrNameLst>
-                                      </p:cBhvr>
-                                      <p:tavLst>
-                                        <p:tav tm="0">
-                                          <p:val>
-                                            <p:strVal val="ppt_y"/>
-                                          </p:val>
-                                        </p:tav>
-                                        <p:tav tm="100000">
-                                          <p:val>
-                                            <p:strVal val="1+ppt_h/2"/>
-                                          </p:val>
-                                        </p:tav>
-                                      </p:tavLst>
-                                    </p:anim>
-                                    <p:set>
-                                      <p:cBhvr>
-                                        <p:cTn id="60" dur="1" fill="hold">
-                                          <p:stCondLst>
-                                            <p:cond delay="499"/>
-                                          </p:stCondLst>
-                                        </p:cTn>
-                                        <p:tgtEl>
-                                          <p:spTgt spid="26"/>
-                                        </p:tgtEl>
-                                        <p:attrNameLst>
-                                          <p:attrName>style.visibility</p:attrName>
-                                        </p:attrNameLst>
-                                      </p:cBhvr>
-                                      <p:to>
-                                        <p:strVal val="hidden"/>
-                                      </p:to>
-                                    </p:set>
-                                  </p:childTnLst>
-                                </p:cTn>
-                              </p:par>
-                              <p:par>
-                                <p:cTn id="61" presetID="2" presetClass="exit" presetSubtype="4" fill="hold" grpId="1" nodeType="withEffect">
-                                  <p:stCondLst>
-                                    <p:cond delay="0"/>
-                                  </p:stCondLst>
-                                  <p:childTnLst>
-                                    <p:anim calcmode="lin" valueType="num">
-                                      <p:cBhvr additive="base">
-                                        <p:cTn id="62" dur="500"/>
-                                        <p:tgtEl>
-                                          <p:spTgt spid="27"/>
-                                        </p:tgtEl>
-                                        <p:attrNameLst>
-                                          <p:attrName>ppt_x</p:attrName>
-                                        </p:attrNameLst>
-                                      </p:cBhvr>
-                                      <p:tavLst>
-                                        <p:tav tm="0">
-                                          <p:val>
-                                            <p:strVal val="ppt_x"/>
-                                          </p:val>
-                                        </p:tav>
-                                        <p:tav tm="100000">
-                                          <p:val>
-                                            <p:strVal val="ppt_x"/>
-                                          </p:val>
-                                        </p:tav>
-                                      </p:tavLst>
-                                    </p:anim>
-                                    <p:anim calcmode="lin" valueType="num">
-                                      <p:cBhvr additive="base">
-                                        <p:cTn id="63" dur="500"/>
-                                        <p:tgtEl>
-                                          <p:spTgt spid="27"/>
-                                        </p:tgtEl>
-                                        <p:attrNameLst>
-                                          <p:attrName>ppt_y</p:attrName>
-                                        </p:attrNameLst>
-                                      </p:cBhvr>
-                                      <p:tavLst>
-                                        <p:tav tm="0">
-                                          <p:val>
-                                            <p:strVal val="ppt_y"/>
-                                          </p:val>
-                                        </p:tav>
-                                        <p:tav tm="100000">
-                                          <p:val>
-                                            <p:strVal val="1+ppt_h/2"/>
-                                          </p:val>
-                                        </p:tav>
-                                      </p:tavLst>
-                                    </p:anim>
-                                    <p:set>
-                                      <p:cBhvr>
-                                        <p:cTn id="64" dur="1" fill="hold">
-                                          <p:stCondLst>
-                                            <p:cond delay="499"/>
-                                          </p:stCondLst>
-                                        </p:cTn>
-                                        <p:tgtEl>
-                                          <p:spTgt spid="27"/>
-                                        </p:tgtEl>
-                                        <p:attrNameLst>
-                                          <p:attrName>style.visibility</p:attrName>
-                                        </p:attrNameLst>
-                                      </p:cBhvr>
-                                      <p:to>
-                                        <p:strVal val="hidden"/>
-                                      </p:to>
-                                    </p:set>
-                                  </p:childTnLst>
-                                </p:cTn>
-                              </p:par>
-                              <p:par>
-                                <p:cTn id="65" presetID="2" presetClass="exit" presetSubtype="4" fill="hold" grpId="1" nodeType="withEffect">
-                                  <p:stCondLst>
-                                    <p:cond delay="0"/>
-                                  </p:stCondLst>
-                                  <p:childTnLst>
-                                    <p:anim calcmode="lin" valueType="num">
-                                      <p:cBhvr additive="base">
-                                        <p:cTn id="66" dur="500"/>
-                                        <p:tgtEl>
-                                          <p:spTgt spid="25"/>
-                                        </p:tgtEl>
-                                        <p:attrNameLst>
-                                          <p:attrName>ppt_x</p:attrName>
-                                        </p:attrNameLst>
-                                      </p:cBhvr>
-                                      <p:tavLst>
-                                        <p:tav tm="0">
-                                          <p:val>
-                                            <p:strVal val="ppt_x"/>
-                                          </p:val>
-                                        </p:tav>
-                                        <p:tav tm="100000">
-                                          <p:val>
-                                            <p:strVal val="ppt_x"/>
-                                          </p:val>
-                                        </p:tav>
-                                      </p:tavLst>
-                                    </p:anim>
-                                    <p:anim calcmode="lin" valueType="num">
-                                      <p:cBhvr additive="base">
-                                        <p:cTn id="67" dur="500"/>
-                                        <p:tgtEl>
-                                          <p:spTgt spid="25"/>
-                                        </p:tgtEl>
-                                        <p:attrNameLst>
-                                          <p:attrName>ppt_y</p:attrName>
-                                        </p:attrNameLst>
-                                      </p:cBhvr>
-                                      <p:tavLst>
-                                        <p:tav tm="0">
-                                          <p:val>
-                                            <p:strVal val="ppt_y"/>
-                                          </p:val>
-                                        </p:tav>
-                                        <p:tav tm="100000">
-                                          <p:val>
-                                            <p:strVal val="1+ppt_h/2"/>
-                                          </p:val>
-                                        </p:tav>
-                                      </p:tavLst>
-                                    </p:anim>
-                                    <p:set>
-                                      <p:cBhvr>
-                                        <p:cTn id="68" dur="1" fill="hold">
-                                          <p:stCondLst>
-                                            <p:cond delay="499"/>
-                                          </p:stCondLst>
-                                        </p:cTn>
-                                        <p:tgtEl>
-                                          <p:spTgt spid="25"/>
-                                        </p:tgtEl>
-                                        <p:attrNameLst>
-                                          <p:attrName>style.visibility</p:attrName>
-                                        </p:attrNameLst>
-                                      </p:cBhvr>
-                                      <p:to>
-                                        <p:strVal val="hidden"/>
-                                      </p:to>
-                                    </p:set>
-                                  </p:childTnLst>
-                                </p:cTn>
-                              </p:par>
-                            </p:childTnLst>
-                          </p:cTn>
-                        </p:par>
-                      </p:childTnLst>
-                    </p:cTn>
-                  </p:par>
-                  <p:par>
-                    <p:cTn id="69" fill="hold">
-                      <p:stCondLst>
-                        <p:cond delay="indefinite"/>
-                      </p:stCondLst>
-                      <p:childTnLst>
-                        <p:par>
-                          <p:cTn id="70" fill="hold">
-                            <p:stCondLst>
-                              <p:cond delay="0"/>
-                            </p:stCondLst>
-                            <p:childTnLst>
-                              <p:par>
-                                <p:cTn id="71" presetID="1" presetClass="entr" presetSubtype="0" fill="hold" nodeType="clickEffect">
-                                  <p:stCondLst>
-                                    <p:cond delay="0"/>
-                                  </p:stCondLst>
-                                  <p:childTnLst>
-                                    <p:set>
-                                      <p:cBhvr>
-                                        <p:cTn id="72" dur="1" fill="hold">
-                                          <p:stCondLst>
-                                            <p:cond delay="0"/>
-                                          </p:stCondLst>
-                                        </p:cTn>
-                                        <p:tgtEl>
-                                          <p:spTgt spid="37"/>
-                                        </p:tgtEl>
-                                        <p:attrNameLst>
-                                          <p:attrName>style.visibility</p:attrName>
-                                        </p:attrNameLst>
-                                      </p:cBhvr>
-                                      <p:to>
-                                        <p:strVal val="visible"/>
-                                      </p:to>
-                                    </p:set>
-                                  </p:childTnLst>
-                                </p:cTn>
-                              </p:par>
-                              <p:par>
-                                <p:cTn id="73" presetID="1" presetClass="entr" presetSubtype="0" fill="hold" grpId="0" nodeType="withEffect">
-                                  <p:stCondLst>
-                                    <p:cond delay="0"/>
-                                  </p:stCondLst>
-                                  <p:childTnLst>
-                                    <p:set>
-                                      <p:cBhvr>
-                                        <p:cTn id="74" dur="1" fill="hold">
-                                          <p:stCondLst>
-                                            <p:cond delay="0"/>
-                                          </p:stCondLst>
-                                        </p:cTn>
-                                        <p:tgtEl>
-                                          <p:spTgt spid="38"/>
-                                        </p:tgtEl>
-                                        <p:attrNameLst>
-                                          <p:attrName>style.visibility</p:attrName>
-                                        </p:attrNameLst>
-                                      </p:cBhvr>
-                                      <p:to>
-                                        <p:strVal val="visible"/>
-                                      </p:to>
-                                    </p:set>
-                                  </p:childTnLst>
-                                </p:cTn>
-                              </p:par>
-                              <p:par>
-                                <p:cTn id="75" presetID="1" presetClass="entr" presetSubtype="0" fill="hold" grpId="0" nodeType="withEffect">
-                                  <p:stCondLst>
-                                    <p:cond delay="0"/>
-                                  </p:stCondLst>
-                                  <p:childTnLst>
-                                    <p:set>
-                                      <p:cBhvr>
-                                        <p:cTn id="76" dur="1" fill="hold">
-                                          <p:stCondLst>
-                                            <p:cond delay="0"/>
-                                          </p:stCondLst>
-                                        </p:cTn>
-                                        <p:tgtEl>
-                                          <p:spTgt spid="36"/>
-                                        </p:tgtEl>
-                                        <p:attrNameLst>
-                                          <p:attrName>style.visibility</p:attrName>
-                                        </p:attrNameLst>
-                                      </p:cBhvr>
-                                      <p:to>
-                                        <p:strVal val="visible"/>
-                                      </p:to>
-                                    </p:set>
-                                  </p:childTnLst>
-                                </p:cTn>
-                              </p:par>
-                            </p:childTnLst>
-                          </p:cTn>
-                        </p:par>
-                      </p:childTnLst>
-                    </p:cTn>
-                  </p:par>
-                  <p:par>
-                    <p:cTn id="77" fill="hold">
-                      <p:stCondLst>
-                        <p:cond delay="indefinite"/>
-                      </p:stCondLst>
-                      <p:childTnLst>
-                        <p:par>
-                          <p:cTn id="78" fill="hold">
-                            <p:stCondLst>
-                              <p:cond delay="0"/>
-                            </p:stCondLst>
-                            <p:childTnLst>
-                              <p:par>
-                                <p:cTn id="79" presetID="2" presetClass="exit" presetSubtype="4" fill="hold" nodeType="clickEffect">
-                                  <p:stCondLst>
-                                    <p:cond delay="0"/>
-                                  </p:stCondLst>
-                                  <p:childTnLst>
-                                    <p:anim calcmode="lin" valueType="num">
-                                      <p:cBhvr additive="base">
-                                        <p:cTn id="80" dur="500"/>
-                                        <p:tgtEl>
-                                          <p:spTgt spid="37"/>
-                                        </p:tgtEl>
-                                        <p:attrNameLst>
-                                          <p:attrName>ppt_x</p:attrName>
-                                        </p:attrNameLst>
-                                      </p:cBhvr>
-                                      <p:tavLst>
-                                        <p:tav tm="0">
-                                          <p:val>
-                                            <p:strVal val="ppt_x"/>
-                                          </p:val>
-                                        </p:tav>
-                                        <p:tav tm="100000">
-                                          <p:val>
-                                            <p:strVal val="ppt_x"/>
-                                          </p:val>
-                                        </p:tav>
-                                      </p:tavLst>
-                                    </p:anim>
-                                    <p:anim calcmode="lin" valueType="num">
-                                      <p:cBhvr additive="base">
-                                        <p:cTn id="81" dur="500"/>
-                                        <p:tgtEl>
-                                          <p:spTgt spid="37"/>
-                                        </p:tgtEl>
-                                        <p:attrNameLst>
-                                          <p:attrName>ppt_y</p:attrName>
-                                        </p:attrNameLst>
-                                      </p:cBhvr>
-                                      <p:tavLst>
-                                        <p:tav tm="0">
-                                          <p:val>
-                                            <p:strVal val="ppt_y"/>
-                                          </p:val>
-                                        </p:tav>
-                                        <p:tav tm="100000">
-                                          <p:val>
-                                            <p:strVal val="1+ppt_h/2"/>
-                                          </p:val>
-                                        </p:tav>
-                                      </p:tavLst>
-                                    </p:anim>
-                                    <p:set>
-                                      <p:cBhvr>
-                                        <p:cTn id="82" dur="1" fill="hold">
-                                          <p:stCondLst>
-                                            <p:cond delay="499"/>
-                                          </p:stCondLst>
-                                        </p:cTn>
-                                        <p:tgtEl>
-                                          <p:spTgt spid="37"/>
-                                        </p:tgtEl>
-                                        <p:attrNameLst>
-                                          <p:attrName>style.visibility</p:attrName>
-                                        </p:attrNameLst>
-                                      </p:cBhvr>
-                                      <p:to>
-                                        <p:strVal val="hidden"/>
-                                      </p:to>
-                                    </p:set>
-                                  </p:childTnLst>
-                                </p:cTn>
-                              </p:par>
-                              <p:par>
-                                <p:cTn id="83" presetID="2" presetClass="exit" presetSubtype="4" fill="hold" grpId="1" nodeType="withEffect">
-                                  <p:stCondLst>
-                                    <p:cond delay="0"/>
-                                  </p:stCondLst>
-                                  <p:childTnLst>
-                                    <p:anim calcmode="lin" valueType="num">
-                                      <p:cBhvr additive="base">
-                                        <p:cTn id="84" dur="500"/>
-                                        <p:tgtEl>
-                                          <p:spTgt spid="38"/>
-                                        </p:tgtEl>
-                                        <p:attrNameLst>
-                                          <p:attrName>ppt_x</p:attrName>
-                                        </p:attrNameLst>
-                                      </p:cBhvr>
-                                      <p:tavLst>
-                                        <p:tav tm="0">
-                                          <p:val>
-                                            <p:strVal val="ppt_x"/>
-                                          </p:val>
-                                        </p:tav>
-                                        <p:tav tm="100000">
-                                          <p:val>
-                                            <p:strVal val="ppt_x"/>
-                                          </p:val>
-                                        </p:tav>
-                                      </p:tavLst>
-                                    </p:anim>
-                                    <p:anim calcmode="lin" valueType="num">
-                                      <p:cBhvr additive="base">
-                                        <p:cTn id="85" dur="500"/>
-                                        <p:tgtEl>
-                                          <p:spTgt spid="38"/>
-                                        </p:tgtEl>
-                                        <p:attrNameLst>
-                                          <p:attrName>ppt_y</p:attrName>
-                                        </p:attrNameLst>
-                                      </p:cBhvr>
-                                      <p:tavLst>
-                                        <p:tav tm="0">
-                                          <p:val>
-                                            <p:strVal val="ppt_y"/>
-                                          </p:val>
-                                        </p:tav>
-                                        <p:tav tm="100000">
-                                          <p:val>
-                                            <p:strVal val="1+ppt_h/2"/>
-                                          </p:val>
-                                        </p:tav>
-                                      </p:tavLst>
-                                    </p:anim>
-                                    <p:set>
-                                      <p:cBhvr>
-                                        <p:cTn id="86" dur="1" fill="hold">
-                                          <p:stCondLst>
-                                            <p:cond delay="499"/>
-                                          </p:stCondLst>
-                                        </p:cTn>
-                                        <p:tgtEl>
-                                          <p:spTgt spid="38"/>
-                                        </p:tgtEl>
-                                        <p:attrNameLst>
-                                          <p:attrName>style.visibility</p:attrName>
-                                        </p:attrNameLst>
-                                      </p:cBhvr>
-                                      <p:to>
-                                        <p:strVal val="hidden"/>
-                                      </p:to>
-                                    </p:set>
-                                  </p:childTnLst>
-                                </p:cTn>
-                              </p:par>
-                              <p:par>
-                                <p:cTn id="87" presetID="2" presetClass="exit" presetSubtype="4" fill="hold" grpId="1" nodeType="withEffect">
-                                  <p:stCondLst>
-                                    <p:cond delay="0"/>
-                                  </p:stCondLst>
-                                  <p:childTnLst>
-                                    <p:anim calcmode="lin" valueType="num">
-                                      <p:cBhvr additive="base">
-                                        <p:cTn id="88" dur="500"/>
-                                        <p:tgtEl>
-                                          <p:spTgt spid="36"/>
-                                        </p:tgtEl>
-                                        <p:attrNameLst>
-                                          <p:attrName>ppt_x</p:attrName>
-                                        </p:attrNameLst>
-                                      </p:cBhvr>
-                                      <p:tavLst>
-                                        <p:tav tm="0">
-                                          <p:val>
-                                            <p:strVal val="ppt_x"/>
-                                          </p:val>
-                                        </p:tav>
-                                        <p:tav tm="100000">
-                                          <p:val>
-                                            <p:strVal val="ppt_x"/>
-                                          </p:val>
-                                        </p:tav>
-                                      </p:tavLst>
-                                    </p:anim>
-                                    <p:anim calcmode="lin" valueType="num">
-                                      <p:cBhvr additive="base">
-                                        <p:cTn id="89" dur="500"/>
-                                        <p:tgtEl>
-                                          <p:spTgt spid="36"/>
-                                        </p:tgtEl>
-                                        <p:attrNameLst>
-                                          <p:attrName>ppt_y</p:attrName>
-                                        </p:attrNameLst>
-                                      </p:cBhvr>
-                                      <p:tavLst>
-                                        <p:tav tm="0">
-                                          <p:val>
-                                            <p:strVal val="ppt_y"/>
-                                          </p:val>
-                                        </p:tav>
-                                        <p:tav tm="100000">
-                                          <p:val>
-                                            <p:strVal val="1+ppt_h/2"/>
-                                          </p:val>
-                                        </p:tav>
-                                      </p:tavLst>
-                                    </p:anim>
-                                    <p:set>
-                                      <p:cBhvr>
-                                        <p:cTn id="90" dur="1" fill="hold">
-                                          <p:stCondLst>
-                                            <p:cond delay="499"/>
-                                          </p:stCondLst>
-                                        </p:cTn>
-                                        <p:tgtEl>
-                                          <p:spTgt spid="36"/>
-                                        </p:tgtEl>
-                                        <p:attrNameLst>
-                                          <p:attrName>style.visibility</p:attrName>
-                                        </p:attrNameLst>
-                                      </p:cBhvr>
-                                      <p:to>
-                                        <p:strVal val="hidden"/>
-                                      </p:to>
-                                    </p:set>
-                                  </p:childTnLst>
-                                </p:cTn>
-                              </p:par>
-                            </p:childTnLst>
-                          </p:cTn>
-                        </p:par>
-                      </p:childTnLst>
-                    </p:cTn>
-                  </p:par>
-                  <p:par>
-                    <p:cTn id="91" fill="hold">
-                      <p:stCondLst>
-                        <p:cond delay="indefinite"/>
-                      </p:stCondLst>
-                      <p:childTnLst>
-                        <p:par>
-                          <p:cTn id="92" fill="hold">
-                            <p:stCondLst>
-                              <p:cond delay="0"/>
-                            </p:stCondLst>
-                            <p:childTnLst>
-                              <p:par>
-                                <p:cTn id="93" presetID="1" presetClass="entr" presetSubtype="0" fill="hold" nodeType="clickEffect">
-                                  <p:stCondLst>
-                                    <p:cond delay="0"/>
-                                  </p:stCondLst>
-                                  <p:childTnLst>
-                                    <p:set>
-                                      <p:cBhvr>
-                                        <p:cTn id="94" dur="1" fill="hold">
-                                          <p:stCondLst>
-                                            <p:cond delay="0"/>
-                                          </p:stCondLst>
-                                        </p:cTn>
-                                        <p:tgtEl>
-                                          <p:spTgt spid="44"/>
-                                        </p:tgtEl>
-                                        <p:attrNameLst>
-                                          <p:attrName>style.visibility</p:attrName>
-                                        </p:attrNameLst>
-                                      </p:cBhvr>
-                                      <p:to>
-                                        <p:strVal val="visible"/>
-                                      </p:to>
-                                    </p:set>
-                                  </p:childTnLst>
-                                </p:cTn>
-                              </p:par>
-                              <p:par>
-                                <p:cTn id="95" presetID="1" presetClass="entr" presetSubtype="0" fill="hold" grpId="0" nodeType="withEffect">
-                                  <p:stCondLst>
-                                    <p:cond delay="0"/>
-                                  </p:stCondLst>
-                                  <p:childTnLst>
-                                    <p:set>
-                                      <p:cBhvr>
-                                        <p:cTn id="96" dur="1" fill="hold">
-                                          <p:stCondLst>
-                                            <p:cond delay="0"/>
-                                          </p:stCondLst>
-                                        </p:cTn>
-                                        <p:tgtEl>
-                                          <p:spTgt spid="45"/>
-                                        </p:tgtEl>
-                                        <p:attrNameLst>
-                                          <p:attrName>style.visibility</p:attrName>
-                                        </p:attrNameLst>
-                                      </p:cBhvr>
-                                      <p:to>
-                                        <p:strVal val="visible"/>
-                                      </p:to>
-                                    </p:set>
-                                  </p:childTnLst>
-                                </p:cTn>
-                              </p:par>
-                              <p:par>
-                                <p:cTn id="97" presetID="1" presetClass="entr" presetSubtype="0" fill="hold" grpId="0" nodeType="withEffect">
-                                  <p:stCondLst>
-                                    <p:cond delay="0"/>
-                                  </p:stCondLst>
-                                  <p:childTnLst>
-                                    <p:set>
-                                      <p:cBhvr>
-                                        <p:cTn id="98" dur="1" fill="hold">
-                                          <p:stCondLst>
-                                            <p:cond delay="0"/>
-                                          </p:stCondLst>
-                                        </p:cTn>
-                                        <p:tgtEl>
-                                          <p:spTgt spid="43"/>
-                                        </p:tgtEl>
-                                        <p:attrNameLst>
-                                          <p:attrName>style.visibility</p:attrName>
-                                        </p:attrNameLst>
-                                      </p:cBhvr>
-                                      <p:to>
-                                        <p:strVal val="visible"/>
-                                      </p:to>
-                                    </p:set>
-                                  </p:childTnLst>
-                                </p:cTn>
-                              </p:par>
-                            </p:childTnLst>
-                          </p:cTn>
-                        </p:par>
-                      </p:childTnLst>
-                    </p:cTn>
-                  </p:par>
-                  <p:par>
-                    <p:cTn id="99" fill="hold">
-                      <p:stCondLst>
-                        <p:cond delay="indefinite"/>
-                      </p:stCondLst>
-                      <p:childTnLst>
-                        <p:par>
-                          <p:cTn id="100" fill="hold">
-                            <p:stCondLst>
-                              <p:cond delay="0"/>
-                            </p:stCondLst>
-                            <p:childTnLst>
-                              <p:par>
-                                <p:cTn id="101" presetID="2" presetClass="exit" presetSubtype="4" fill="hold" nodeType="clickEffect">
-                                  <p:stCondLst>
-                                    <p:cond delay="0"/>
-                                  </p:stCondLst>
-                                  <p:childTnLst>
-                                    <p:anim calcmode="lin" valueType="num">
-                                      <p:cBhvr additive="base">
-                                        <p:cTn id="102" dur="500"/>
-                                        <p:tgtEl>
-                                          <p:spTgt spid="44"/>
-                                        </p:tgtEl>
-                                        <p:attrNameLst>
-                                          <p:attrName>ppt_x</p:attrName>
-                                        </p:attrNameLst>
-                                      </p:cBhvr>
-                                      <p:tavLst>
-                                        <p:tav tm="0">
-                                          <p:val>
-                                            <p:strVal val="ppt_x"/>
-                                          </p:val>
-                                        </p:tav>
-                                        <p:tav tm="100000">
-                                          <p:val>
-                                            <p:strVal val="ppt_x"/>
-                                          </p:val>
-                                        </p:tav>
-                                      </p:tavLst>
-                                    </p:anim>
-                                    <p:anim calcmode="lin" valueType="num">
-                                      <p:cBhvr additive="base">
-                                        <p:cTn id="103" dur="500"/>
-                                        <p:tgtEl>
-                                          <p:spTgt spid="44"/>
-                                        </p:tgtEl>
-                                        <p:attrNameLst>
-                                          <p:attrName>ppt_y</p:attrName>
-                                        </p:attrNameLst>
-                                      </p:cBhvr>
-                                      <p:tavLst>
-                                        <p:tav tm="0">
-                                          <p:val>
-                                            <p:strVal val="ppt_y"/>
-                                          </p:val>
-                                        </p:tav>
-                                        <p:tav tm="100000">
-                                          <p:val>
-                                            <p:strVal val="1+ppt_h/2"/>
-                                          </p:val>
-                                        </p:tav>
-                                      </p:tavLst>
-                                    </p:anim>
-                                    <p:set>
-                                      <p:cBhvr>
-                                        <p:cTn id="104" dur="1" fill="hold">
-                                          <p:stCondLst>
-                                            <p:cond delay="499"/>
-                                          </p:stCondLst>
-                                        </p:cTn>
-                                        <p:tgtEl>
-                                          <p:spTgt spid="44"/>
-                                        </p:tgtEl>
-                                        <p:attrNameLst>
-                                          <p:attrName>style.visibility</p:attrName>
-                                        </p:attrNameLst>
-                                      </p:cBhvr>
-                                      <p:to>
-                                        <p:strVal val="hidden"/>
-                                      </p:to>
-                                    </p:set>
-                                  </p:childTnLst>
-                                </p:cTn>
-                              </p:par>
-                              <p:par>
-                                <p:cTn id="105" presetID="2" presetClass="exit" presetSubtype="4" fill="hold" grpId="1" nodeType="withEffect">
-                                  <p:stCondLst>
-                                    <p:cond delay="0"/>
-                                  </p:stCondLst>
-                                  <p:childTnLst>
-                                    <p:anim calcmode="lin" valueType="num">
-                                      <p:cBhvr additive="base">
-                                        <p:cTn id="106" dur="500"/>
-                                        <p:tgtEl>
-                                          <p:spTgt spid="45"/>
-                                        </p:tgtEl>
-                                        <p:attrNameLst>
-                                          <p:attrName>ppt_x</p:attrName>
-                                        </p:attrNameLst>
-                                      </p:cBhvr>
-                                      <p:tavLst>
-                                        <p:tav tm="0">
-                                          <p:val>
-                                            <p:strVal val="ppt_x"/>
-                                          </p:val>
-                                        </p:tav>
-                                        <p:tav tm="100000">
-                                          <p:val>
-                                            <p:strVal val="ppt_x"/>
-                                          </p:val>
-                                        </p:tav>
-                                      </p:tavLst>
-                                    </p:anim>
-                                    <p:anim calcmode="lin" valueType="num">
-                                      <p:cBhvr additive="base">
-                                        <p:cTn id="107" dur="500"/>
-                                        <p:tgtEl>
-                                          <p:spTgt spid="45"/>
-                                        </p:tgtEl>
-                                        <p:attrNameLst>
-                                          <p:attrName>ppt_y</p:attrName>
-                                        </p:attrNameLst>
-                                      </p:cBhvr>
-                                      <p:tavLst>
-                                        <p:tav tm="0">
-                                          <p:val>
-                                            <p:strVal val="ppt_y"/>
-                                          </p:val>
-                                        </p:tav>
-                                        <p:tav tm="100000">
-                                          <p:val>
-                                            <p:strVal val="1+ppt_h/2"/>
-                                          </p:val>
-                                        </p:tav>
-                                      </p:tavLst>
-                                    </p:anim>
-                                    <p:set>
-                                      <p:cBhvr>
-                                        <p:cTn id="108" dur="1" fill="hold">
-                                          <p:stCondLst>
-                                            <p:cond delay="499"/>
-                                          </p:stCondLst>
-                                        </p:cTn>
-                                        <p:tgtEl>
-                                          <p:spTgt spid="45"/>
-                                        </p:tgtEl>
-                                        <p:attrNameLst>
-                                          <p:attrName>style.visibility</p:attrName>
-                                        </p:attrNameLst>
-                                      </p:cBhvr>
-                                      <p:to>
-                                        <p:strVal val="hidden"/>
-                                      </p:to>
-                                    </p:set>
-                                  </p:childTnLst>
-                                </p:cTn>
-                              </p:par>
-                              <p:par>
-                                <p:cTn id="109" presetID="2" presetClass="exit" presetSubtype="4" fill="hold" grpId="1" nodeType="withEffect">
-                                  <p:stCondLst>
-                                    <p:cond delay="0"/>
-                                  </p:stCondLst>
-                                  <p:childTnLst>
-                                    <p:anim calcmode="lin" valueType="num">
-                                      <p:cBhvr additive="base">
-                                        <p:cTn id="110" dur="500"/>
-                                        <p:tgtEl>
-                                          <p:spTgt spid="43"/>
-                                        </p:tgtEl>
-                                        <p:attrNameLst>
-                                          <p:attrName>ppt_x</p:attrName>
-                                        </p:attrNameLst>
-                                      </p:cBhvr>
-                                      <p:tavLst>
-                                        <p:tav tm="0">
-                                          <p:val>
-                                            <p:strVal val="ppt_x"/>
-                                          </p:val>
-                                        </p:tav>
-                                        <p:tav tm="100000">
-                                          <p:val>
-                                            <p:strVal val="ppt_x"/>
-                                          </p:val>
-                                        </p:tav>
-                                      </p:tavLst>
-                                    </p:anim>
-                                    <p:anim calcmode="lin" valueType="num">
-                                      <p:cBhvr additive="base">
-                                        <p:cTn id="111" dur="500"/>
-                                        <p:tgtEl>
-                                          <p:spTgt spid="43"/>
-                                        </p:tgtEl>
-                                        <p:attrNameLst>
-                                          <p:attrName>ppt_y</p:attrName>
-                                        </p:attrNameLst>
-                                      </p:cBhvr>
-                                      <p:tavLst>
-                                        <p:tav tm="0">
-                                          <p:val>
-                                            <p:strVal val="ppt_y"/>
-                                          </p:val>
-                                        </p:tav>
-                                        <p:tav tm="100000">
-                                          <p:val>
-                                            <p:strVal val="1+ppt_h/2"/>
-                                          </p:val>
-                                        </p:tav>
-                                      </p:tavLst>
-                                    </p:anim>
-                                    <p:set>
-                                      <p:cBhvr>
-                                        <p:cTn id="112" dur="1" fill="hold">
-                                          <p:stCondLst>
-                                            <p:cond delay="499"/>
-                                          </p:stCondLst>
-                                        </p:cTn>
-                                        <p:tgtEl>
-                                          <p:spTgt spid="43"/>
-                                        </p:tgtEl>
-                                        <p:attrNameLst>
-                                          <p:attrName>style.visibility</p:attrName>
-                                        </p:attrNameLst>
-                                      </p:cBhvr>
-                                      <p:to>
-                                        <p:strVal val="hidden"/>
-                                      </p:to>
-                                    </p:set>
-                                  </p:childTnLst>
-                                </p:cTn>
-                              </p:par>
-                            </p:childTnLst>
-                          </p:cTn>
-                        </p:par>
-                      </p:childTnLst>
-                    </p:cTn>
-                  </p:par>
-                  <p:par>
-                    <p:cTn id="113" fill="hold">
-                      <p:stCondLst>
-                        <p:cond delay="indefinite"/>
-                      </p:stCondLst>
-                      <p:childTnLst>
-                        <p:par>
-                          <p:cTn id="114" fill="hold">
-                            <p:stCondLst>
-                              <p:cond delay="0"/>
-                            </p:stCondLst>
-                            <p:childTnLst>
-                              <p:par>
-                                <p:cTn id="115" presetID="1" presetClass="entr" presetSubtype="0" fill="hold" nodeType="clickEffect">
-                                  <p:stCondLst>
-                                    <p:cond delay="0"/>
-                                  </p:stCondLst>
-                                  <p:childTnLst>
-                                    <p:set>
-                                      <p:cBhvr>
-                                        <p:cTn id="116" dur="1" fill="hold">
-                                          <p:stCondLst>
-                                            <p:cond delay="0"/>
-                                          </p:stCondLst>
-                                        </p:cTn>
-                                        <p:tgtEl>
-                                          <p:spTgt spid="8"/>
-                                        </p:tgtEl>
-                                        <p:attrNameLst>
-                                          <p:attrName>style.visibility</p:attrName>
-                                        </p:attrNameLst>
-                                      </p:cBhvr>
-                                      <p:to>
-                                        <p:strVal val="visible"/>
-                                      </p:to>
-                                    </p:set>
-                                  </p:childTnLst>
-                                </p:cTn>
-                              </p:par>
-                              <p:par>
-                                <p:cTn id="117" presetID="1" presetClass="entr" presetSubtype="0" fill="hold" grpId="0" nodeType="withEffect">
-                                  <p:stCondLst>
-                                    <p:cond delay="0"/>
-                                  </p:stCondLst>
-                                  <p:childTnLst>
-                                    <p:set>
-                                      <p:cBhvr>
-                                        <p:cTn id="118" dur="1" fill="hold">
-                                          <p:stCondLst>
-                                            <p:cond delay="0"/>
-                                          </p:stCondLst>
-                                        </p:cTn>
-                                        <p:tgtEl>
-                                          <p:spTgt spid="9"/>
-                                        </p:tgtEl>
-                                        <p:attrNameLst>
-                                          <p:attrName>style.visibility</p:attrName>
-                                        </p:attrNameLst>
-                                      </p:cBhvr>
-                                      <p:to>
-                                        <p:strVal val="visible"/>
-                                      </p:to>
-                                    </p:set>
-                                  </p:childTnLst>
-                                </p:cTn>
-                              </p:par>
-                              <p:par>
-                                <p:cTn id="119" presetID="1" presetClass="entr" presetSubtype="0" fill="hold" grpId="0" nodeType="withEffect">
-                                  <p:stCondLst>
-                                    <p:cond delay="0"/>
-                                  </p:stCondLst>
-                                  <p:childTnLst>
-                                    <p:set>
-                                      <p:cBhvr>
-                                        <p:cTn id="120" dur="1" fill="hold">
-                                          <p:stCondLst>
-                                            <p:cond delay="0"/>
-                                          </p:stCondLst>
-                                        </p:cTn>
-                                        <p:tgtEl>
-                                          <p:spTgt spid="7"/>
-                                        </p:tgtEl>
-                                        <p:attrNameLst>
-                                          <p:attrName>style.visibility</p:attrName>
-                                        </p:attrNameLst>
-                                      </p:cBhvr>
-                                      <p:to>
-                                        <p:strVal val="visible"/>
-                                      </p:to>
-                                    </p:set>
-                                  </p:childTnLst>
-                                </p:cTn>
-                              </p:par>
-                            </p:childTnLst>
-                          </p:cTn>
-                        </p:par>
-                      </p:childTnLst>
-                    </p:cTn>
-                  </p:par>
-                </p:childTnLst>
-              </p:cTn>
-              <p:prevCondLst>
-                <p:cond evt="onPrev" delay="0">
-                  <p:tgtEl>
-                    <p:sldTgt/>
-                  </p:tgtEl>
-                </p:cond>
-              </p:prevCondLst>
-              <p:nextCondLst>
-                <p:cond evt="onNext" delay="0">
-                  <p:tgtEl>
-                    <p:sldTgt/>
-                  </p:tgtEl>
-                </p:cond>
-              </p:nextCondLst>
-            </p:seq>
-          </p:childTnLst>
-        </p:cTn>
-      </p:par>
-    </p:tnLst>
-    <p:bldLst>
-      <p:bldP spid="4" grpId="0" animBg="1"/>
-      <p:bldP spid="4" grpId="1" animBg="1"/>
-      <p:bldP spid="6" grpId="0" animBg="1"/>
-      <p:bldP spid="6" grpId="1" animBg="1"/>
-      <p:bldP spid="14" grpId="0" animBg="1"/>
-      <p:bldP spid="14" grpId="1" animBg="1"/>
-      <p:bldP spid="16" grpId="0" animBg="1"/>
-      <p:bldP spid="16" grpId="1" animBg="1"/>
-      <p:bldP spid="25" grpId="0" animBg="1"/>
-      <p:bldP spid="25" grpId="1" animBg="1"/>
-      <p:bldP spid="27" grpId="0" animBg="1"/>
-      <p:bldP spid="27" grpId="1" animBg="1"/>
-      <p:bldP spid="36" grpId="0" animBg="1"/>
-      <p:bldP spid="36" grpId="1" animBg="1"/>
-      <p:bldP spid="38" grpId="0" animBg="1"/>
-      <p:bldP spid="38" grpId="1" animBg="1"/>
-      <p:bldP spid="43" grpId="0" animBg="1"/>
-      <p:bldP spid="43" grpId="1" animBg="1"/>
-      <p:bldP spid="45" grpId="0" animBg="1"/>
-      <p:bldP spid="45" grpId="1" animBg="1"/>
-      <p:bldP spid="7" grpId="0" animBg="1"/>
-      <p:bldP spid="9" grpId="0" animBg="1"/>
-    </p:bldLst>
-  </p:timing>
-</p:sld>
-</file>
-
-<file path=ppt/slides/slide21.xml><?xml version="1.0" encoding="utf-8"?>
-<p:sld xmlns:a="http://schemas.openxmlformats.org/drawingml/2006/main" xmlns:r="http://schemas.openxmlformats.org/officeDocument/2006/relationships" xmlns:p="http://schemas.openxmlformats.org/presentationml/2006/main">
-  <p:cSld>
-    <p:spTree>
-      <p:nvGrpSpPr>
-        <p:cNvPr id="1" name=""/>
-        <p:cNvGrpSpPr/>
-        <p:nvPr/>
-      </p:nvGrpSpPr>
-      <p:grpSpPr>
-        <a:xfrm>
-          <a:off x="0" y="0"/>
-          <a:ext cx="0" cy="0"/>
-          <a:chOff x="0" y="0"/>
-          <a:chExt cx="0" cy="0"/>
-        </a:xfrm>
-      </p:grpSpPr>
-      <p:sp>
-        <p:nvSpPr>
-          <p:cNvPr id="2" name="Title 1">
-            <a:extLst>
-              <a:ext uri="{FF2B5EF4-FFF2-40B4-BE49-F238E27FC236}">
-                <a16:creationId xmlns:a16="http://schemas.microsoft.com/office/drawing/2014/main" id="{118C212E-98BB-B9A3-DFE9-B4F95E1EA6F8}"/>
-              </a:ext>
-            </a:extLst>
-          </p:cNvPr>
-          <p:cNvSpPr>
-            <a:spLocks noGrp="1"/>
-          </p:cNvSpPr>
-          <p:nvPr>
-            <p:ph type="title"/>
-          </p:nvPr>
-        </p:nvSpPr>
-        <p:spPr/>
-        <p:txBody>
-          <a:bodyPr/>
-          <a:lstStyle/>
-          <a:p>
-            <a:r>
-              <a:rPr lang="en-GB" dirty="0" err="1"/>
-              <a:t>processBlock</a:t>
-            </a:r>
-            <a:r>
-              <a:rPr lang="en-GB" dirty="0"/>
               <a:t> 2 – apply delay</a:t>
             </a:r>
           </a:p>
@@ -29109,7 +25181,7 @@
         <p:spPr>
           <a:xfrm>
             <a:off x="8692662" y="493601"/>
-            <a:ext cx="3273956" cy="707886"/>
+            <a:ext cx="1968527" cy="707886"/>
           </a:xfrm>
           <a:prstGeom prst="rect">
             <a:avLst/>
@@ -29131,7 +25203,7 @@
           <a:p>
             <a:r>
               <a:rPr lang="en-GB" sz="2000" dirty="0"/>
-              <a:t>Go through each channel of audio that's passed in</a:t>
+              <a:t>Go through each audio channel</a:t>
             </a:r>
           </a:p>
         </p:txBody>
@@ -29472,8 +25544,8 @@
         </p:nvCxnSpPr>
         <p:spPr>
           <a:xfrm>
-            <a:off x="7392785" y="3450177"/>
-            <a:ext cx="1043096" cy="526737"/>
+            <a:off x="7264681" y="3361571"/>
+            <a:ext cx="1171200" cy="408211"/>
           </a:xfrm>
           <a:prstGeom prst="straightConnector1">
             <a:avLst/>
@@ -29512,7 +25584,7 @@
         </p:nvSpPr>
         <p:spPr>
           <a:xfrm>
-            <a:off x="8435881" y="3469082"/>
+            <a:off x="8435881" y="3261950"/>
             <a:ext cx="3627998" cy="1015663"/>
           </a:xfrm>
           <a:prstGeom prst="rect">
@@ -29623,7 +25695,7 @@
         <p:spPr>
           <a:xfrm>
             <a:off x="5552901" y="4178407"/>
-            <a:ext cx="2421775" cy="1279911"/>
+            <a:ext cx="2696944" cy="1279911"/>
           </a:xfrm>
           <a:prstGeom prst="straightConnector1">
             <a:avLst/>
@@ -29662,8 +25734,8 @@
         </p:nvSpPr>
         <p:spPr>
           <a:xfrm>
-            <a:off x="7974676" y="5104375"/>
-            <a:ext cx="4089203" cy="707886"/>
+            <a:off x="8249845" y="5104375"/>
+            <a:ext cx="3814034" cy="707886"/>
           </a:xfrm>
           <a:prstGeom prst="rect">
             <a:avLst/>
@@ -29685,7 +25757,7 @@
           <a:p>
             <a:r>
               <a:rPr lang="en-GB" sz="2000" dirty="0"/>
-              <a:t>set current output value for this channel, this sample, replacing input</a:t>
+              <a:t>set current output for this channel, this sample, replacing input</a:t>
             </a:r>
           </a:p>
         </p:txBody>
@@ -32157,8 +28229,8 @@
 </p:sld>
 </file>
 
-<file path=ppt/slides/slide22.xml><?xml version="1.0" encoding="utf-8"?>
-<p:sld xmlns:a="http://schemas.openxmlformats.org/drawingml/2006/main" xmlns:r="http://schemas.openxmlformats.org/officeDocument/2006/relationships" xmlns:p="http://schemas.openxmlformats.org/presentationml/2006/main">
+<file path=ppt/slides/slide21.xml><?xml version="1.0" encoding="utf-8"?>
+<p:sld xmlns:a="http://schemas.openxmlformats.org/drawingml/2006/main" xmlns:r="http://schemas.openxmlformats.org/officeDocument/2006/relationships" xmlns:p="http://schemas.openxmlformats.org/presentationml/2006/main" show="0">
   <p:cSld>
     <p:spTree>
       <p:nvGrpSpPr>
@@ -35042,7 +31114,7 @@
 </p:sld>
 </file>
 
-<file path=ppt/slides/slide23.xml><?xml version="1.0" encoding="utf-8"?>
+<file path=ppt/slides/slide22.xml><?xml version="1.0" encoding="utf-8"?>
 <p:sld xmlns:a="http://schemas.openxmlformats.org/drawingml/2006/main" xmlns:r="http://schemas.openxmlformats.org/officeDocument/2006/relationships" xmlns:p="http://schemas.openxmlformats.org/presentationml/2006/main" show="0">
   <p:cSld>
     <p:spTree>
@@ -37634,7 +33706,7 @@
 </p:sld>
 </file>
 
-<file path=ppt/slides/slide24.xml><?xml version="1.0" encoding="utf-8"?>
+<file path=ppt/slides/slide23.xml><?xml version="1.0" encoding="utf-8"?>
 <p:sld xmlns:a="http://schemas.openxmlformats.org/drawingml/2006/main" xmlns:r="http://schemas.openxmlformats.org/officeDocument/2006/relationships" xmlns:p="http://schemas.openxmlformats.org/presentationml/2006/main" show="0">
   <p:cSld>
     <p:spTree>
@@ -42472,8 +38544,8 @@
 </p:sld>
 </file>
 
-<file path=ppt/slides/slide25.xml><?xml version="1.0" encoding="utf-8"?>
-<p:sld xmlns:a="http://schemas.openxmlformats.org/drawingml/2006/main" xmlns:r="http://schemas.openxmlformats.org/officeDocument/2006/relationships" xmlns:p="http://schemas.openxmlformats.org/presentationml/2006/main">
+<file path=ppt/slides/slide24.xml><?xml version="1.0" encoding="utf-8"?>
+<p:sld xmlns:a="http://schemas.openxmlformats.org/drawingml/2006/main" xmlns:r="http://schemas.openxmlformats.org/officeDocument/2006/relationships" xmlns:p="http://schemas.openxmlformats.org/presentationml/2006/main" show="0">
   <p:cSld>
     <p:spTree>
       <p:nvGrpSpPr>
@@ -44157,8 +40229,8 @@
 </p:sld>
 </file>
 
-<file path=ppt/slides/slide26.xml><?xml version="1.0" encoding="utf-8"?>
-<p:sld xmlns:a="http://schemas.openxmlformats.org/drawingml/2006/main" xmlns:r="http://schemas.openxmlformats.org/officeDocument/2006/relationships" xmlns:p="http://schemas.openxmlformats.org/presentationml/2006/main">
+<file path=ppt/slides/slide25.xml><?xml version="1.0" encoding="utf-8"?>
+<p:sld xmlns:a="http://schemas.openxmlformats.org/drawingml/2006/main" xmlns:r="http://schemas.openxmlformats.org/officeDocument/2006/relationships" xmlns:p="http://schemas.openxmlformats.org/presentationml/2006/main" show="0">
   <p:cSld>
     <p:spTree>
       <p:nvGrpSpPr>
@@ -45143,8 +41215,8 @@
 </p:sld>
 </file>
 
-<file path=ppt/slides/slide27.xml><?xml version="1.0" encoding="utf-8"?>
-<p:sld xmlns:a="http://schemas.openxmlformats.org/drawingml/2006/main" xmlns:r="http://schemas.openxmlformats.org/officeDocument/2006/relationships" xmlns:p="http://schemas.openxmlformats.org/presentationml/2006/main">
+<file path=ppt/slides/slide26.xml><?xml version="1.0" encoding="utf-8"?>
+<p:sld xmlns:a="http://schemas.openxmlformats.org/drawingml/2006/main" xmlns:r="http://schemas.openxmlformats.org/officeDocument/2006/relationships" xmlns:p="http://schemas.openxmlformats.org/presentationml/2006/main" show="0">
   <p:cSld>
     <p:spTree>
       <p:nvGrpSpPr>

</xml_diff>